<commit_message>
add: update function docs and slideshow
</commit_message>
<xml_diff>
--- a/docs/slideshow/BRIEF - Wonderland Pharma - Création d'un site web dynamique qui interagit avec une base de données.pptx
+++ b/docs/slideshow/BRIEF - Wonderland Pharma - Création d'un site web dynamique qui interagit avec une base de données.pptx
@@ -27,30 +27,32 @@
     <p:sldId id="272" r:id="rId22"/>
     <p:sldId id="273" r:id="rId23"/>
     <p:sldId id="274" r:id="rId24"/>
+    <p:sldId id="275" r:id="rId25"/>
+    <p:sldId id="276" r:id="rId26"/>
   </p:sldIdLst>
   <p:sldSz cy="5143500" cx="9144000"/>
   <p:notesSz cx="6858000" cy="9144000"/>
   <p:embeddedFontLst>
     <p:embeddedFont>
       <p:font typeface="Poppins"/>
-      <p:regular r:id="rId25"/>
-      <p:bold r:id="rId26"/>
-      <p:italic r:id="rId27"/>
-      <p:boldItalic r:id="rId28"/>
+      <p:regular r:id="rId27"/>
+      <p:bold r:id="rId28"/>
+      <p:italic r:id="rId29"/>
+      <p:boldItalic r:id="rId30"/>
     </p:embeddedFont>
     <p:embeddedFont>
       <p:font typeface="Poppins Light"/>
-      <p:regular r:id="rId29"/>
-      <p:bold r:id="rId30"/>
-      <p:italic r:id="rId31"/>
-      <p:boldItalic r:id="rId32"/>
+      <p:regular r:id="rId31"/>
+      <p:bold r:id="rId32"/>
+      <p:italic r:id="rId33"/>
+      <p:boldItalic r:id="rId34"/>
     </p:embeddedFont>
     <p:embeddedFont>
       <p:font typeface="Helvetica Neue"/>
-      <p:regular r:id="rId33"/>
-      <p:bold r:id="rId34"/>
-      <p:italic r:id="rId35"/>
-      <p:boldItalic r:id="rId36"/>
+      <p:regular r:id="rId35"/>
+      <p:bold r:id="rId36"/>
+      <p:italic r:id="rId37"/>
+      <p:boldItalic r:id="rId38"/>
     </p:embeddedFont>
   </p:embeddedFontLst>
   <p:defaultTextStyle>
@@ -1637,7 +1639,7 @@
       </p:grpSpPr>
       <p:sp>
         <p:nvSpPr>
-          <p:cNvPr id="231" name="Google Shape;231;g2b6f0ca811f_1_218:notes"/>
+          <p:cNvPr id="231" name="Google Shape;231;g2b75bbd875b_0_5:notes"/>
           <p:cNvSpPr/>
           <p:nvPr>
             <p:ph idx="2" type="sldImg"/>
@@ -1672,7 +1674,7 @@
       </p:sp>
       <p:sp>
         <p:nvSpPr>
-          <p:cNvPr id="232" name="Google Shape;232;g2b6f0ca811f_1_218:notes"/>
+          <p:cNvPr id="232" name="Google Shape;232;g2b75bbd875b_0_5:notes"/>
           <p:cNvSpPr txBox="1"/>
           <p:nvPr>
             <p:ph idx="1" type="body"/>
@@ -1722,7 +1724,7 @@
   <p:cSld>
     <p:spTree>
       <p:nvGrpSpPr>
-        <p:cNvPr id="240" name="Shape 240"/>
+        <p:cNvPr id="239" name="Shape 239"/>
         <p:cNvGrpSpPr/>
         <p:nvPr/>
       </p:nvGrpSpPr>
@@ -1736,7 +1738,7 @@
       </p:grpSpPr>
       <p:sp>
         <p:nvSpPr>
-          <p:cNvPr id="241" name="Google Shape;241;g2b6f0ca811f_1_58:notes"/>
+          <p:cNvPr id="240" name="Google Shape;240;g2b75bbd875b_0_13:notes"/>
           <p:cNvSpPr/>
           <p:nvPr>
             <p:ph idx="2" type="sldImg"/>
@@ -1771,7 +1773,7 @@
       </p:sp>
       <p:sp>
         <p:nvSpPr>
-          <p:cNvPr id="242" name="Google Shape;242;g2b6f0ca811f_1_58:notes"/>
+          <p:cNvPr id="241" name="Google Shape;241;g2b75bbd875b_0_13:notes"/>
           <p:cNvSpPr txBox="1"/>
           <p:nvPr>
             <p:ph idx="1" type="body"/>
@@ -1871,6 +1873,204 @@
       <p:sp>
         <p:nvSpPr>
           <p:cNvPr id="64" name="Google Shape;64;g2b6f0ca811f_0_0:notes"/>
+          <p:cNvSpPr txBox="1"/>
+          <p:nvPr>
+            <p:ph idx="1" type="body"/>
+          </p:nvPr>
+        </p:nvSpPr>
+        <p:spPr>
+          <a:xfrm>
+            <a:off x="685800" y="4343400"/>
+            <a:ext cx="5486400" cy="4114800"/>
+          </a:xfrm>
+          <a:prstGeom prst="rect">
+            <a:avLst/>
+          </a:prstGeom>
+        </p:spPr>
+        <p:txBody>
+          <a:bodyPr anchorCtr="0" anchor="t" bIns="91425" lIns="91425" spcFirstLastPara="1" rIns="91425" wrap="square" tIns="91425">
+            <a:noAutofit/>
+          </a:bodyPr>
+          <a:lstStyle/>
+          <a:p>
+            <a:pPr indent="0" lvl="0" marL="0" rtl="0" algn="l">
+              <a:spcBef>
+                <a:spcPts val="0"/>
+              </a:spcBef>
+              <a:spcAft>
+                <a:spcPts val="0"/>
+              </a:spcAft>
+              <a:buNone/>
+            </a:pPr>
+            <a:r>
+              <a:t/>
+            </a:r>
+            <a:endParaRPr/>
+          </a:p>
+        </p:txBody>
+      </p:sp>
+    </p:spTree>
+  </p:cSld>
+  <p:clrMapOvr>
+    <a:masterClrMapping/>
+  </p:clrMapOvr>
+</p:notes>
+</file>
+
+<file path=ppt/notesSlides/notesSlide20.xml><?xml version="1.0" encoding="utf-8"?>
+<p:notes xmlns:a="http://schemas.openxmlformats.org/drawingml/2006/main" xmlns:r="http://schemas.openxmlformats.org/officeDocument/2006/relationships" xmlns:mc="http://schemas.openxmlformats.org/markup-compatibility/2006" xmlns:mv="urn:schemas-microsoft-com:mac:vml" xmlns:p="http://schemas.openxmlformats.org/presentationml/2006/main" xmlns:c="http://schemas.openxmlformats.org/drawingml/2006/chart" xmlns:dgm="http://schemas.openxmlformats.org/drawingml/2006/diagram" xmlns:o="urn:schemas-microsoft-com:office:office" xmlns:v="urn:schemas-microsoft-com:vml" xmlns:pvml="urn:schemas-microsoft-com:office:powerpoint" xmlns:com="http://schemas.openxmlformats.org/drawingml/2006/compatibility" xmlns:p14="http://schemas.microsoft.com/office/powerpoint/2010/main" xmlns:p15="http://schemas.microsoft.com/office/powerpoint/2012/main" xmlns:ahyp="http://schemas.microsoft.com/office/drawing/2018/hyperlinkcolor" showMasterPhAnim="0" showMasterSp="0">
+  <p:cSld>
+    <p:spTree>
+      <p:nvGrpSpPr>
+        <p:cNvPr id="248" name="Shape 248"/>
+        <p:cNvGrpSpPr/>
+        <p:nvPr/>
+      </p:nvGrpSpPr>
+      <p:grpSpPr>
+        <a:xfrm>
+          <a:off x="0" y="0"/>
+          <a:ext cx="0" cy="0"/>
+          <a:chOff x="0" y="0"/>
+          <a:chExt cx="0" cy="0"/>
+        </a:xfrm>
+      </p:grpSpPr>
+      <p:sp>
+        <p:nvSpPr>
+          <p:cNvPr id="249" name="Google Shape;249;g2b6f0ca811f_1_218:notes"/>
+          <p:cNvSpPr/>
+          <p:nvPr>
+            <p:ph idx="2" type="sldImg"/>
+          </p:nvPr>
+        </p:nvSpPr>
+        <p:spPr>
+          <a:xfrm>
+            <a:off x="381300" y="685800"/>
+            <a:ext cx="6096000" cy="3429000"/>
+          </a:xfrm>
+          <a:custGeom>
+            <a:rect b="b" l="l" r="r" t="t"/>
+            <a:pathLst>
+              <a:path extrusionOk="0" h="120000" w="120000">
+                <a:moveTo>
+                  <a:pt x="0" y="0"/>
+                </a:moveTo>
+                <a:lnTo>
+                  <a:pt x="120000" y="0"/>
+                </a:lnTo>
+                <a:lnTo>
+                  <a:pt x="120000" y="120000"/>
+                </a:lnTo>
+                <a:lnTo>
+                  <a:pt x="0" y="120000"/>
+                </a:lnTo>
+                <a:close/>
+              </a:path>
+            </a:pathLst>
+          </a:custGeom>
+        </p:spPr>
+      </p:sp>
+      <p:sp>
+        <p:nvSpPr>
+          <p:cNvPr id="250" name="Google Shape;250;g2b6f0ca811f_1_218:notes"/>
+          <p:cNvSpPr txBox="1"/>
+          <p:nvPr>
+            <p:ph idx="1" type="body"/>
+          </p:nvPr>
+        </p:nvSpPr>
+        <p:spPr>
+          <a:xfrm>
+            <a:off x="685800" y="4343400"/>
+            <a:ext cx="5486400" cy="4114800"/>
+          </a:xfrm>
+          <a:prstGeom prst="rect">
+            <a:avLst/>
+          </a:prstGeom>
+        </p:spPr>
+        <p:txBody>
+          <a:bodyPr anchorCtr="0" anchor="t" bIns="91425" lIns="91425" spcFirstLastPara="1" rIns="91425" wrap="square" tIns="91425">
+            <a:noAutofit/>
+          </a:bodyPr>
+          <a:lstStyle/>
+          <a:p>
+            <a:pPr indent="0" lvl="0" marL="0" rtl="0" algn="l">
+              <a:spcBef>
+                <a:spcPts val="0"/>
+              </a:spcBef>
+              <a:spcAft>
+                <a:spcPts val="0"/>
+              </a:spcAft>
+              <a:buNone/>
+            </a:pPr>
+            <a:r>
+              <a:t/>
+            </a:r>
+            <a:endParaRPr/>
+          </a:p>
+        </p:txBody>
+      </p:sp>
+    </p:spTree>
+  </p:cSld>
+  <p:clrMapOvr>
+    <a:masterClrMapping/>
+  </p:clrMapOvr>
+</p:notes>
+</file>
+
+<file path=ppt/notesSlides/notesSlide21.xml><?xml version="1.0" encoding="utf-8"?>
+<p:notes xmlns:a="http://schemas.openxmlformats.org/drawingml/2006/main" xmlns:r="http://schemas.openxmlformats.org/officeDocument/2006/relationships" xmlns:mc="http://schemas.openxmlformats.org/markup-compatibility/2006" xmlns:mv="urn:schemas-microsoft-com:mac:vml" xmlns:p="http://schemas.openxmlformats.org/presentationml/2006/main" xmlns:c="http://schemas.openxmlformats.org/drawingml/2006/chart" xmlns:dgm="http://schemas.openxmlformats.org/drawingml/2006/diagram" xmlns:o="urn:schemas-microsoft-com:office:office" xmlns:v="urn:schemas-microsoft-com:vml" xmlns:pvml="urn:schemas-microsoft-com:office:powerpoint" xmlns:com="http://schemas.openxmlformats.org/drawingml/2006/compatibility" xmlns:p14="http://schemas.microsoft.com/office/powerpoint/2010/main" xmlns:p15="http://schemas.microsoft.com/office/powerpoint/2012/main" xmlns:ahyp="http://schemas.microsoft.com/office/drawing/2018/hyperlinkcolor" showMasterPhAnim="0" showMasterSp="0">
+  <p:cSld>
+    <p:spTree>
+      <p:nvGrpSpPr>
+        <p:cNvPr id="258" name="Shape 258"/>
+        <p:cNvGrpSpPr/>
+        <p:nvPr/>
+      </p:nvGrpSpPr>
+      <p:grpSpPr>
+        <a:xfrm>
+          <a:off x="0" y="0"/>
+          <a:ext cx="0" cy="0"/>
+          <a:chOff x="0" y="0"/>
+          <a:chExt cx="0" cy="0"/>
+        </a:xfrm>
+      </p:grpSpPr>
+      <p:sp>
+        <p:nvSpPr>
+          <p:cNvPr id="259" name="Google Shape;259;g2b6f0ca811f_1_58:notes"/>
+          <p:cNvSpPr/>
+          <p:nvPr>
+            <p:ph idx="2" type="sldImg"/>
+          </p:nvPr>
+        </p:nvSpPr>
+        <p:spPr>
+          <a:xfrm>
+            <a:off x="381300" y="685800"/>
+            <a:ext cx="6096000" cy="3429000"/>
+          </a:xfrm>
+          <a:custGeom>
+            <a:rect b="b" l="l" r="r" t="t"/>
+            <a:pathLst>
+              <a:path extrusionOk="0" h="120000" w="120000">
+                <a:moveTo>
+                  <a:pt x="0" y="0"/>
+                </a:moveTo>
+                <a:lnTo>
+                  <a:pt x="120000" y="0"/>
+                </a:lnTo>
+                <a:lnTo>
+                  <a:pt x="120000" y="120000"/>
+                </a:lnTo>
+                <a:lnTo>
+                  <a:pt x="0" y="120000"/>
+                </a:lnTo>
+                <a:close/>
+              </a:path>
+            </a:pathLst>
+          </a:custGeom>
+        </p:spPr>
+      </p:sp>
+      <p:sp>
+        <p:nvSpPr>
+          <p:cNvPr id="260" name="Google Shape;260;g2b6f0ca811f_1_58:notes"/>
           <p:cNvSpPr txBox="1"/>
           <p:nvPr>
             <p:ph idx="1" type="body"/>
@@ -9660,7 +9860,7 @@
                 <a:cs typeface="Poppins Light"/>
                 <a:sym typeface="Poppins Light"/>
               </a:rPr>
-              <a:t>Elle retourne le titre de la page, son URL et mets la class active si le lien correspond à la page courante.</a:t>
+              <a:t>Elle retourne le titre de la page, son URL et ajoute la class active si le lien correspond à la page courante.</a:t>
             </a:r>
             <a:endParaRPr sz="1200">
               <a:latin typeface="Poppins"/>
@@ -10927,7 +11127,7 @@
         <p:spPr>
           <a:xfrm>
             <a:off x="410850" y="2184175"/>
-            <a:ext cx="3829200" cy="1847100"/>
+            <a:ext cx="3829200" cy="1569900"/>
           </a:xfrm>
           <a:prstGeom prst="rect">
             <a:avLst/>
@@ -11030,7 +11230,7 @@
                 <a:cs typeface="Poppins"/>
                 <a:sym typeface="Poppins"/>
               </a:rPr>
-              <a:t>$products</a:t>
+              <a:t>$doctors</a:t>
             </a:r>
             <a:r>
               <a:rPr lang="fr" sz="1200">
@@ -11042,7 +11242,7 @@
                 <a:cs typeface="Poppins Light"/>
                 <a:sym typeface="Poppins Light"/>
               </a:rPr>
-              <a:t> le résultat de la requête $productsQuery.</a:t>
+              <a:t> le résultat de la requête $doctorsQuery.</a:t>
             </a:r>
             <a:br>
               <a:rPr lang="fr" sz="1200">
@@ -11100,7 +11300,7 @@
                 <a:cs typeface="Poppins Light"/>
                 <a:sym typeface="Poppins Light"/>
               </a:rPr>
-              <a:t> pour générer à chaque itération une carte produit. On utilise la même fonction pour les cartes docteurs.</a:t>
+              <a:t> pour générer à chaque itération une carte produit.</a:t>
             </a:r>
             <a:endParaRPr sz="1200">
               <a:latin typeface="Poppins"/>
@@ -11147,13 +11347,13 @@
           <a:blip r:embed="rId3">
             <a:alphaModFix/>
           </a:blip>
-          <a:srcRect b="0" l="355" r="55763" t="0"/>
+          <a:srcRect b="0" l="0" r="55424" t="0"/>
           <a:stretch/>
         </p:blipFill>
         <p:spPr>
           <a:xfrm>
             <a:off x="4572000" y="-125"/>
-            <a:ext cx="4572001" cy="5143500"/>
+            <a:ext cx="4572001" cy="5143501"/>
           </a:xfrm>
           <a:prstGeom prst="rect">
             <a:avLst/>
@@ -11247,7 +11447,7 @@
         </p:nvSpPr>
         <p:spPr>
           <a:xfrm>
-            <a:off x="447196" y="577200"/>
+            <a:off x="410846" y="745825"/>
             <a:ext cx="3676200" cy="277200"/>
           </a:xfrm>
           <a:prstGeom prst="rect">
@@ -11284,26 +11484,38 @@
             <a:r>
               <a:rPr b="1" lang="fr" sz="1800">
                 <a:solidFill>
-                  <a:srgbClr val="FF3266"/>
+                  <a:srgbClr val="F6F9FF"/>
                 </a:solidFill>
                 <a:latin typeface="Poppins"/>
                 <a:ea typeface="Poppins"/>
                 <a:cs typeface="Poppins"/>
                 <a:sym typeface="Poppins"/>
               </a:rPr>
-              <a:t>Doc</a:t>
+              <a:t>Fonction </a:t>
             </a:r>
             <a:r>
               <a:rPr b="1" lang="fr" sz="1800">
                 <a:solidFill>
-                  <a:srgbClr val="F6F9FF"/>
+                  <a:srgbClr val="FF3266"/>
                 </a:solidFill>
                 <a:latin typeface="Poppins"/>
                 <a:ea typeface="Poppins"/>
                 <a:cs typeface="Poppins"/>
                 <a:sym typeface="Poppins"/>
               </a:rPr>
-              <a:t>umentations</a:t>
+              <a:t>getSortedProducts</a:t>
+            </a:r>
+            <a:r>
+              <a:rPr lang="fr" sz="1800">
+                <a:solidFill>
+                  <a:srgbClr val="FF3266"/>
+                </a:solidFill>
+                <a:latin typeface="Poppins"/>
+                <a:ea typeface="Poppins"/>
+                <a:cs typeface="Poppins"/>
+                <a:sym typeface="Poppins"/>
+              </a:rPr>
+              <a:t>( )</a:t>
             </a:r>
             <a:endParaRPr sz="1800">
               <a:latin typeface="Poppins"/>
@@ -11322,8 +11534,8 @@
         </p:nvSpPr>
         <p:spPr>
           <a:xfrm>
-            <a:off x="447199" y="1604750"/>
-            <a:ext cx="3676200" cy="738900"/>
+            <a:off x="410849" y="1661013"/>
+            <a:ext cx="3676200" cy="2678400"/>
           </a:xfrm>
           <a:prstGeom prst="rect">
             <a:avLst/>
@@ -11366,7 +11578,7 @@
                 <a:cs typeface="Poppins Light"/>
                 <a:sym typeface="Poppins Light"/>
               </a:rPr>
-              <a:t>Dans le répertoire </a:t>
+              <a:t>La fonction </a:t>
             </a:r>
             <a:r>
               <a:rPr b="1" lang="fr" sz="1200">
@@ -11378,7 +11590,7 @@
                 <a:cs typeface="Poppins"/>
                 <a:sym typeface="Poppins"/>
               </a:rPr>
-              <a:t>docs</a:t>
+              <a:t>getSortedProducts</a:t>
             </a:r>
             <a:r>
               <a:rPr lang="fr" sz="1200">
@@ -11390,96 +11602,31 @@
                 <a:cs typeface="Poppins Light"/>
                 <a:sym typeface="Poppins Light"/>
               </a:rPr>
-              <a:t> on trouve les différentes documentations (référentiel) au format Markdown.</a:t>
-            </a:r>
-            <a:endParaRPr sz="1200">
-              <a:solidFill>
-                <a:srgbClr val="C8CBD1"/>
-              </a:solidFill>
-              <a:latin typeface="Poppins Light"/>
-              <a:ea typeface="Poppins Light"/>
-              <a:cs typeface="Poppins Light"/>
-              <a:sym typeface="Poppins Light"/>
-            </a:endParaRPr>
-          </a:p>
-        </p:txBody>
-      </p:sp>
-      <p:sp>
-        <p:nvSpPr>
-          <p:cNvPr id="237" name="Google Shape;237;p30"/>
-          <p:cNvSpPr txBox="1"/>
-          <p:nvPr/>
-        </p:nvSpPr>
-        <p:spPr>
-          <a:xfrm>
-            <a:off x="123075" y="2673325"/>
-            <a:ext cx="4152000" cy="2077200"/>
-          </a:xfrm>
-          <a:prstGeom prst="rect">
-            <a:avLst/>
-          </a:prstGeom>
-          <a:noFill/>
-          <a:ln>
-            <a:noFill/>
-          </a:ln>
-        </p:spPr>
-        <p:txBody>
-          <a:bodyPr anchorCtr="0" anchor="t" bIns="91425" lIns="91425" spcFirstLastPara="1" rIns="91425" wrap="square" tIns="91425">
-            <a:noAutofit/>
-          </a:bodyPr>
-          <a:lstStyle/>
-          <a:p>
-            <a:pPr indent="-304800" lvl="0" marL="457200" rtl="0" algn="l">
-              <a:lnSpc>
-                <a:spcPct val="150000"/>
-              </a:lnSpc>
-              <a:spcBef>
-                <a:spcPts val="0"/>
-              </a:spcBef>
-              <a:spcAft>
-                <a:spcPts val="0"/>
-              </a:spcAft>
-              <a:buClr>
-                <a:srgbClr val="404145"/>
-              </a:buClr>
-              <a:buSzPts val="1200"/>
-              <a:buChar char="●"/>
-            </a:pPr>
+              <a:t>(</a:t>
+            </a:r>
             <a:r>
               <a:rPr b="1" lang="fr" sz="1200">
                 <a:solidFill>
-                  <a:srgbClr val="F6F9FF"/>
+                  <a:srgbClr val="C8CBD1"/>
                 </a:solidFill>
                 <a:latin typeface="Poppins"/>
                 <a:ea typeface="Poppins"/>
                 <a:cs typeface="Poppins"/>
                 <a:sym typeface="Poppins"/>
               </a:rPr>
-              <a:t>STRUCTURE.md </a:t>
+              <a:t>$db, $orderBy</a:t>
             </a:r>
             <a:r>
               <a:rPr lang="fr" sz="1200">
                 <a:solidFill>
-                  <a:srgbClr val="F6F9FF"/>
+                  <a:srgbClr val="C8CBD1"/>
                 </a:solidFill>
                 <a:latin typeface="Poppins Light"/>
                 <a:ea typeface="Poppins Light"/>
                 <a:cs typeface="Poppins Light"/>
                 <a:sym typeface="Poppins Light"/>
               </a:rPr>
-              <a:t>: </a:t>
-            </a:r>
-            <a:r>
-              <a:rPr lang="fr" sz="1200">
-                <a:solidFill>
-                  <a:srgbClr val="C8CBD1"/>
-                </a:solidFill>
-                <a:latin typeface="Poppins Light"/>
-                <a:ea typeface="Poppins Light"/>
-                <a:cs typeface="Poppins Light"/>
-                <a:sym typeface="Poppins Light"/>
-              </a:rPr>
-              <a:t>description des différents fichiers et répertoires.</a:t>
+              <a:t>)  récupère les produits à partir de la base de données en les triant par prix (soit en ordre croissant, soit en ordre décroissant) en fonction de la préférence de l’utilisateur.</a:t>
             </a:r>
             <a:endParaRPr sz="1200">
               <a:solidFill>
@@ -11492,7 +11639,7 @@
             </a:endParaRPr>
           </a:p>
           <a:p>
-            <a:pPr indent="-304800" lvl="0" marL="457200" rtl="0" algn="l">
+            <a:pPr indent="0" lvl="0" marL="0" marR="0" rtl="0" algn="l">
               <a:lnSpc>
                 <a:spcPct val="150000"/>
               </a:lnSpc>
@@ -11503,46 +11650,14 @@
                 <a:spcPts val="0"/>
               </a:spcAft>
               <a:buClr>
-                <a:srgbClr val="404145"/>
+                <a:srgbClr val="C8CBD1"/>
               </a:buClr>
-              <a:buSzPts val="1200"/>
-              <a:buChar char="●"/>
+              <a:buSzPts val="1800"/>
+              <a:buFont typeface="Poppins Light"/>
+              <a:buNone/>
             </a:pPr>
             <a:r>
-              <a:rPr b="1" lang="fr" sz="1200">
-                <a:solidFill>
-                  <a:srgbClr val="F6F9FF"/>
-                </a:solidFill>
-                <a:latin typeface="Poppins"/>
-                <a:ea typeface="Poppins"/>
-                <a:cs typeface="Poppins"/>
-                <a:sym typeface="Poppins"/>
-              </a:rPr>
-              <a:t>DATABASE.md</a:t>
-            </a:r>
-            <a:r>
-              <a:rPr lang="fr" sz="1200">
-                <a:solidFill>
-                  <a:srgbClr val="F6F9FF"/>
-                </a:solidFill>
-                <a:latin typeface="Poppins Light"/>
-                <a:ea typeface="Poppins Light"/>
-                <a:cs typeface="Poppins Light"/>
-                <a:sym typeface="Poppins Light"/>
-              </a:rPr>
-              <a:t> : </a:t>
-            </a:r>
-            <a:r>
-              <a:rPr lang="fr" sz="1200">
-                <a:solidFill>
-                  <a:srgbClr val="C8CBD1"/>
-                </a:solidFill>
-                <a:latin typeface="Poppins Light"/>
-                <a:ea typeface="Poppins Light"/>
-                <a:cs typeface="Poppins Light"/>
-                <a:sym typeface="Poppins Light"/>
-              </a:rPr>
-              <a:t>documentation sur la base de données.</a:t>
+              <a:t/>
             </a:r>
             <a:endParaRPr sz="1200">
               <a:solidFill>
@@ -11555,7 +11670,7 @@
             </a:endParaRPr>
           </a:p>
           <a:p>
-            <a:pPr indent="-304800" lvl="0" marL="457200" rtl="0" algn="l">
+            <a:pPr indent="0" lvl="0" marL="0" marR="0" rtl="0" algn="l">
               <a:lnSpc>
                 <a:spcPct val="150000"/>
               </a:lnSpc>
@@ -11566,34 +11681,59 @@
                 <a:spcPts val="0"/>
               </a:spcAft>
               <a:buClr>
-                <a:srgbClr val="404145"/>
+                <a:srgbClr val="C8CBD1"/>
               </a:buClr>
-              <a:buSzPts val="1200"/>
-              <a:buChar char="●"/>
+              <a:buSzPts val="1800"/>
+              <a:buFont typeface="Poppins Light"/>
+              <a:buNone/>
             </a:pPr>
             <a:r>
+              <a:rPr lang="fr" sz="1200">
+                <a:solidFill>
+                  <a:srgbClr val="C8CBD1"/>
+                </a:solidFill>
+                <a:latin typeface="Poppins Light"/>
+                <a:ea typeface="Poppins Light"/>
+                <a:cs typeface="Poppins Light"/>
+                <a:sym typeface="Poppins Light"/>
+              </a:rPr>
+              <a:t>Elle prend en premier paramètre la connexion à la bdd </a:t>
+            </a:r>
+            <a:r>
               <a:rPr b="1" lang="fr" sz="1200">
                 <a:solidFill>
-                  <a:srgbClr val="F6F9FF"/>
+                  <a:srgbClr val="C8CBD1"/>
                 </a:solidFill>
                 <a:latin typeface="Poppins"/>
                 <a:ea typeface="Poppins"/>
                 <a:cs typeface="Poppins"/>
                 <a:sym typeface="Poppins"/>
               </a:rPr>
-              <a:t>FUNCTION.md</a:t>
+              <a:t>$db</a:t>
             </a:r>
             <a:r>
               <a:rPr lang="fr" sz="1200">
                 <a:solidFill>
-                  <a:srgbClr val="F6F9FF"/>
+                  <a:srgbClr val="C8CBD1"/>
                 </a:solidFill>
                 <a:latin typeface="Poppins Light"/>
                 <a:ea typeface="Poppins Light"/>
                 <a:cs typeface="Poppins Light"/>
                 <a:sym typeface="Poppins Light"/>
               </a:rPr>
-              <a:t> : </a:t>
+              <a:t> et en second la préférence de tri </a:t>
+            </a:r>
+            <a:r>
+              <a:rPr b="1" lang="fr" sz="1200">
+                <a:solidFill>
+                  <a:srgbClr val="C8CBD1"/>
+                </a:solidFill>
+                <a:latin typeface="Poppins"/>
+                <a:ea typeface="Poppins"/>
+                <a:cs typeface="Poppins"/>
+                <a:sym typeface="Poppins"/>
+              </a:rPr>
+              <a:t>$orderBy</a:t>
             </a:r>
             <a:r>
               <a:rPr lang="fr" sz="1200">
@@ -11605,7 +11745,55 @@
                 <a:cs typeface="Poppins Light"/>
                 <a:sym typeface="Poppins Light"/>
               </a:rPr>
-              <a:t>documentation détaillée sur les fonctions utilisées sur le site.</a:t>
+              <a:t> (soit </a:t>
+            </a:r>
+            <a:r>
+              <a:rPr b="1" lang="fr" sz="1200">
+                <a:solidFill>
+                  <a:srgbClr val="C8CBD1"/>
+                </a:solidFill>
+                <a:latin typeface="Poppins"/>
+                <a:ea typeface="Poppins"/>
+                <a:cs typeface="Poppins"/>
+                <a:sym typeface="Poppins"/>
+              </a:rPr>
+              <a:t>ASC</a:t>
+            </a:r>
+            <a:r>
+              <a:rPr lang="fr" sz="1200">
+                <a:solidFill>
+                  <a:srgbClr val="C8CBD1"/>
+                </a:solidFill>
+                <a:latin typeface="Poppins Light"/>
+                <a:ea typeface="Poppins Light"/>
+                <a:cs typeface="Poppins Light"/>
+                <a:sym typeface="Poppins Light"/>
+              </a:rPr>
+              <a:t> pour croissant ou </a:t>
+            </a:r>
+            <a:r>
+              <a:rPr b="1" lang="fr" sz="1200">
+                <a:solidFill>
+                  <a:srgbClr val="C8CBD1"/>
+                </a:solidFill>
+                <a:latin typeface="Poppins"/>
+                <a:ea typeface="Poppins"/>
+                <a:cs typeface="Poppins"/>
+                <a:sym typeface="Poppins"/>
+              </a:rPr>
+              <a:t>DESC</a:t>
+            </a:r>
+            <a:r>
+              <a:rPr lang="fr" sz="1200">
+                <a:solidFill>
+                  <a:srgbClr val="C8CBD1"/>
+                </a:solidFill>
+                <a:latin typeface="Poppins Light"/>
+                <a:ea typeface="Poppins Light"/>
+                <a:cs typeface="Poppins Light"/>
+                <a:sym typeface="Poppins Light"/>
+              </a:rPr>
+              <a:t> pour décroissant).</a:t>
             </a:r>
             <a:endParaRPr sz="1200">
               <a:solidFill>
@@ -11621,13 +11809,13 @@
       </p:sp>
       <p:cxnSp>
         <p:nvCxnSpPr>
-          <p:cNvPr id="238" name="Google Shape;238;p30"/>
+          <p:cNvPr id="237" name="Google Shape;237;p30"/>
           <p:cNvCxnSpPr/>
           <p:nvPr/>
         </p:nvCxnSpPr>
         <p:spPr>
           <a:xfrm>
-            <a:off x="447192" y="1230772"/>
+            <a:off x="410842" y="1342022"/>
             <a:ext cx="694200" cy="0"/>
           </a:xfrm>
           <a:prstGeom prst="straightConnector1">
@@ -11647,7 +11835,7 @@
       </p:cxnSp>
       <p:pic>
         <p:nvPicPr>
-          <p:cNvPr id="239" name="Google Shape;239;p30"/>
+          <p:cNvPr id="238" name="Google Shape;238;p30"/>
           <p:cNvPicPr preferRelativeResize="0"/>
           <p:nvPr/>
         </p:nvPicPr>
@@ -11655,13 +11843,13 @@
           <a:blip r:embed="rId3">
             <a:alphaModFix/>
           </a:blip>
-          <a:srcRect b="2210" l="0" r="55818" t="0"/>
+          <a:srcRect b="0" l="0" r="55209" t="0"/>
           <a:stretch/>
         </p:blipFill>
         <p:spPr>
           <a:xfrm>
-            <a:off x="4572000" y="-125"/>
-            <a:ext cx="4572001" cy="5143500"/>
+            <a:off x="4572000" y="0"/>
+            <a:ext cx="4572001" cy="5143501"/>
           </a:xfrm>
           <a:prstGeom prst="rect">
             <a:avLst/>
@@ -11692,7 +11880,7 @@
     </p:bg>
     <p:spTree>
       <p:nvGrpSpPr>
-        <p:cNvPr id="243" name="Shape 243"/>
+        <p:cNvPr id="242" name="Shape 242"/>
         <p:cNvGrpSpPr/>
         <p:nvPr/>
       </p:nvGrpSpPr>
@@ -11706,14 +11894,57 @@
       </p:grpSpPr>
       <p:sp>
         <p:nvSpPr>
+          <p:cNvPr id="243" name="Google Shape;243;p31"/>
+          <p:cNvSpPr/>
+          <p:nvPr/>
+        </p:nvSpPr>
+        <p:spPr>
+          <a:xfrm>
+            <a:off x="4572000" y="-125"/>
+            <a:ext cx="4572000" cy="5143500"/>
+          </a:xfrm>
+          <a:prstGeom prst="rect">
+            <a:avLst/>
+          </a:prstGeom>
+          <a:solidFill>
+            <a:srgbClr val="D1D3DB"/>
+          </a:solidFill>
+          <a:ln>
+            <a:noFill/>
+          </a:ln>
+        </p:spPr>
+        <p:txBody>
+          <a:bodyPr anchorCtr="0" anchor="ctr" bIns="91425" lIns="91425" spcFirstLastPara="1" rIns="91425" wrap="square" tIns="91425">
+            <a:noAutofit/>
+          </a:bodyPr>
+          <a:lstStyle/>
+          <a:p>
+            <a:pPr indent="0" lvl="0" marL="0" rtl="0" algn="l">
+              <a:spcBef>
+                <a:spcPts val="0"/>
+              </a:spcBef>
+              <a:spcAft>
+                <a:spcPts val="0"/>
+              </a:spcAft>
+              <a:buNone/>
+            </a:pPr>
+            <a:r>
+              <a:t/>
+            </a:r>
+            <a:endParaRPr/>
+          </a:p>
+        </p:txBody>
+      </p:sp>
+      <p:sp>
+        <p:nvSpPr>
           <p:cNvPr id="244" name="Google Shape;244;p31"/>
           <p:cNvSpPr txBox="1"/>
           <p:nvPr/>
         </p:nvSpPr>
         <p:spPr>
           <a:xfrm>
-            <a:off x="447200" y="658425"/>
-            <a:ext cx="3947100" cy="1219200"/>
+            <a:off x="410846" y="745825"/>
+            <a:ext cx="3676200" cy="609600"/>
           </a:xfrm>
           <a:prstGeom prst="rect">
             <a:avLst/>
@@ -11747,30 +11978,42 @@
               <a:buNone/>
             </a:pPr>
             <a:r>
-              <a:rPr b="1" lang="fr" sz="3600">
-                <a:solidFill>
-                  <a:srgbClr val="FF3266"/>
+              <a:rPr b="1" lang="fr" sz="1800">
+                <a:solidFill>
+                  <a:srgbClr val="F6F9FF"/>
                 </a:solidFill>
                 <a:latin typeface="Poppins"/>
                 <a:ea typeface="Poppins"/>
                 <a:cs typeface="Poppins"/>
                 <a:sym typeface="Poppins"/>
               </a:rPr>
-              <a:t>Merci</a:t>
-            </a:r>
-            <a:r>
-              <a:rPr b="1" lang="fr" sz="3600">
-                <a:solidFill>
-                  <a:srgbClr val="F6F9FF"/>
+              <a:t>Appel de la fonction </a:t>
+            </a:r>
+            <a:r>
+              <a:rPr b="1" lang="fr" sz="1800">
+                <a:solidFill>
+                  <a:srgbClr val="FF3266"/>
                 </a:solidFill>
                 <a:latin typeface="Poppins"/>
                 <a:ea typeface="Poppins"/>
                 <a:cs typeface="Poppins"/>
                 <a:sym typeface="Poppins"/>
               </a:rPr>
-              <a:t> pour votre attention</a:t>
-            </a:r>
-            <a:endParaRPr b="1" sz="3600">
+              <a:t>getSortedProducts</a:t>
+            </a:r>
+            <a:r>
+              <a:rPr lang="fr" sz="1800">
+                <a:solidFill>
+                  <a:srgbClr val="FF3266"/>
+                </a:solidFill>
+                <a:latin typeface="Poppins"/>
+                <a:ea typeface="Poppins"/>
+                <a:cs typeface="Poppins"/>
+                <a:sym typeface="Poppins"/>
+              </a:rPr>
+              <a:t>( )</a:t>
+            </a:r>
+            <a:endParaRPr sz="1800">
               <a:latin typeface="Poppins"/>
               <a:ea typeface="Poppins"/>
               <a:cs typeface="Poppins"/>
@@ -11787,8 +12030,8 @@
         </p:nvSpPr>
         <p:spPr>
           <a:xfrm>
-            <a:off x="447199" y="3033225"/>
-            <a:ext cx="3676200" cy="554100"/>
+            <a:off x="410850" y="2184175"/>
+            <a:ext cx="3829200" cy="2124300"/>
           </a:xfrm>
           <a:prstGeom prst="rect">
             <a:avLst/>
@@ -11822,7 +12065,7 @@
               <a:buNone/>
             </a:pPr>
             <a:r>
-              <a:rPr lang="fr" sz="3600">
+              <a:rPr lang="fr" sz="1200">
                 <a:solidFill>
                   <a:srgbClr val="C8CBD1"/>
                 </a:solidFill>
@@ -11831,9 +12074,139 @@
                 <a:cs typeface="Poppins Light"/>
                 <a:sym typeface="Poppins Light"/>
               </a:rPr>
-              <a:t>Des questions ?</a:t>
-            </a:r>
-            <a:endParaRPr sz="3600">
+              <a:t>Nous appelons la fonction </a:t>
+            </a:r>
+            <a:r>
+              <a:rPr b="1" lang="fr" sz="1200">
+                <a:solidFill>
+                  <a:srgbClr val="C8CBD1"/>
+                </a:solidFill>
+                <a:latin typeface="Poppins"/>
+                <a:ea typeface="Poppins"/>
+                <a:cs typeface="Poppins"/>
+                <a:sym typeface="Poppins"/>
+              </a:rPr>
+              <a:t>getSortedProducts</a:t>
+            </a:r>
+            <a:r>
+              <a:rPr lang="fr" sz="1200">
+                <a:solidFill>
+                  <a:srgbClr val="C8CBD1"/>
+                </a:solidFill>
+                <a:latin typeface="Poppins Light"/>
+                <a:ea typeface="Poppins Light"/>
+                <a:cs typeface="Poppins Light"/>
+                <a:sym typeface="Poppins Light"/>
+              </a:rPr>
+              <a:t>(</a:t>
+            </a:r>
+            <a:r>
+              <a:rPr b="1" lang="fr" sz="1200">
+                <a:solidFill>
+                  <a:srgbClr val="C8CBD1"/>
+                </a:solidFill>
+                <a:latin typeface="Poppins"/>
+                <a:ea typeface="Poppins"/>
+                <a:cs typeface="Poppins"/>
+                <a:sym typeface="Poppins"/>
+              </a:rPr>
+              <a:t>$db, $orderBy</a:t>
+            </a:r>
+            <a:r>
+              <a:rPr lang="fr" sz="1200">
+                <a:solidFill>
+                  <a:srgbClr val="C8CBD1"/>
+                </a:solidFill>
+                <a:latin typeface="Poppins Light"/>
+                <a:ea typeface="Poppins Light"/>
+                <a:cs typeface="Poppins Light"/>
+                <a:sym typeface="Poppins Light"/>
+              </a:rPr>
+              <a:t>) qui nous retourne dans </a:t>
+            </a:r>
+            <a:r>
+              <a:rPr b="1" lang="fr" sz="1200">
+                <a:solidFill>
+                  <a:srgbClr val="C8CBD1"/>
+                </a:solidFill>
+                <a:latin typeface="Poppins"/>
+                <a:ea typeface="Poppins"/>
+                <a:cs typeface="Poppins"/>
+                <a:sym typeface="Poppins"/>
+              </a:rPr>
+              <a:t>$products</a:t>
+            </a:r>
+            <a:r>
+              <a:rPr lang="fr" sz="1200">
+                <a:solidFill>
+                  <a:srgbClr val="C8CBD1"/>
+                </a:solidFill>
+                <a:latin typeface="Poppins Light"/>
+                <a:ea typeface="Poppins Light"/>
+                <a:cs typeface="Poppins Light"/>
+                <a:sym typeface="Poppins Light"/>
+              </a:rPr>
+              <a:t> le résultat de la requête avec les prix triés par ordre croissant ou décroissant en fonction du choix de l’utilisateur.</a:t>
+            </a:r>
+            <a:br>
+              <a:rPr lang="fr" sz="1200">
+                <a:solidFill>
+                  <a:srgbClr val="C8CBD1"/>
+                </a:solidFill>
+                <a:latin typeface="Poppins Light"/>
+                <a:ea typeface="Poppins Light"/>
+                <a:cs typeface="Poppins Light"/>
+                <a:sym typeface="Poppins Light"/>
+              </a:rPr>
+            </a:br>
+            <a:br>
+              <a:rPr lang="fr" sz="1200">
+                <a:solidFill>
+                  <a:srgbClr val="C8CBD1"/>
+                </a:solidFill>
+                <a:latin typeface="Poppins Light"/>
+                <a:ea typeface="Poppins Light"/>
+                <a:cs typeface="Poppins Light"/>
+                <a:sym typeface="Poppins Light"/>
+              </a:rPr>
+            </a:br>
+            <a:r>
+              <a:rPr lang="fr" sz="1200">
+                <a:solidFill>
+                  <a:srgbClr val="C8CBD1"/>
+                </a:solidFill>
+                <a:latin typeface="Poppins Light"/>
+                <a:ea typeface="Poppins Light"/>
+                <a:cs typeface="Poppins Light"/>
+                <a:sym typeface="Poppins Light"/>
+              </a:rPr>
+              <a:t>On utilise ensuite une boucle </a:t>
+            </a:r>
+            <a:r>
+              <a:rPr b="1" lang="fr" sz="1200">
+                <a:solidFill>
+                  <a:srgbClr val="C8CBD1"/>
+                </a:solidFill>
+                <a:latin typeface="Poppins"/>
+                <a:ea typeface="Poppins"/>
+                <a:cs typeface="Poppins"/>
+                <a:sym typeface="Poppins"/>
+              </a:rPr>
+              <a:t>foreach</a:t>
+            </a:r>
+            <a:r>
+              <a:rPr lang="fr" sz="1200">
+                <a:solidFill>
+                  <a:srgbClr val="C8CBD1"/>
+                </a:solidFill>
+                <a:latin typeface="Poppins Light"/>
+                <a:ea typeface="Poppins Light"/>
+                <a:cs typeface="Poppins Light"/>
+                <a:sym typeface="Poppins Light"/>
+              </a:rPr>
+              <a:t> pour générer à chaque itération une carte produit.</a:t>
+            </a:r>
+            <a:endParaRPr sz="1200">
               <a:latin typeface="Poppins"/>
               <a:ea typeface="Poppins"/>
               <a:cs typeface="Poppins"/>
@@ -11842,486 +12215,15 @@
           </a:p>
         </p:txBody>
       </p:sp>
-      <p:sp>
-        <p:nvSpPr>
-          <p:cNvPr id="246" name="Google Shape;246;p31"/>
-          <p:cNvSpPr/>
-          <p:nvPr/>
-        </p:nvSpPr>
-        <p:spPr>
-          <a:xfrm>
-            <a:off x="6716334" y="562427"/>
-            <a:ext cx="1827606" cy="1662255"/>
-          </a:xfrm>
-          <a:custGeom>
-            <a:rect b="b" l="l" r="r" t="t"/>
-            <a:pathLst>
-              <a:path extrusionOk="0" h="14752" w="16218">
-                <a:moveTo>
-                  <a:pt x="7694" y="0"/>
-                </a:moveTo>
-                <a:lnTo>
-                  <a:pt x="7279" y="25"/>
-                </a:lnTo>
-                <a:lnTo>
-                  <a:pt x="6863" y="74"/>
-                </a:lnTo>
-                <a:lnTo>
-                  <a:pt x="6473" y="123"/>
-                </a:lnTo>
-                <a:lnTo>
-                  <a:pt x="6082" y="196"/>
-                </a:lnTo>
-                <a:lnTo>
-                  <a:pt x="5691" y="293"/>
-                </a:lnTo>
-                <a:lnTo>
-                  <a:pt x="5325" y="416"/>
-                </a:lnTo>
-                <a:lnTo>
-                  <a:pt x="4958" y="538"/>
-                </a:lnTo>
-                <a:lnTo>
-                  <a:pt x="4592" y="660"/>
-                </a:lnTo>
-                <a:lnTo>
-                  <a:pt x="4250" y="831"/>
-                </a:lnTo>
-                <a:lnTo>
-                  <a:pt x="3908" y="977"/>
-                </a:lnTo>
-                <a:lnTo>
-                  <a:pt x="3566" y="1173"/>
-                </a:lnTo>
-                <a:lnTo>
-                  <a:pt x="3249" y="1368"/>
-                </a:lnTo>
-                <a:lnTo>
-                  <a:pt x="2956" y="1563"/>
-                </a:lnTo>
-                <a:lnTo>
-                  <a:pt x="2663" y="1783"/>
-                </a:lnTo>
-                <a:lnTo>
-                  <a:pt x="2370" y="2003"/>
-                </a:lnTo>
-                <a:lnTo>
-                  <a:pt x="2101" y="2247"/>
-                </a:lnTo>
-                <a:lnTo>
-                  <a:pt x="1857" y="2492"/>
-                </a:lnTo>
-                <a:lnTo>
-                  <a:pt x="1612" y="2760"/>
-                </a:lnTo>
-                <a:lnTo>
-                  <a:pt x="1393" y="3029"/>
-                </a:lnTo>
-                <a:lnTo>
-                  <a:pt x="1173" y="3298"/>
-                </a:lnTo>
-                <a:lnTo>
-                  <a:pt x="977" y="3591"/>
-                </a:lnTo>
-                <a:lnTo>
-                  <a:pt x="807" y="3884"/>
-                </a:lnTo>
-                <a:lnTo>
-                  <a:pt x="636" y="4201"/>
-                </a:lnTo>
-                <a:lnTo>
-                  <a:pt x="489" y="4519"/>
-                </a:lnTo>
-                <a:lnTo>
-                  <a:pt x="367" y="4836"/>
-                </a:lnTo>
-                <a:lnTo>
-                  <a:pt x="245" y="5154"/>
-                </a:lnTo>
-                <a:lnTo>
-                  <a:pt x="172" y="5496"/>
-                </a:lnTo>
-                <a:lnTo>
-                  <a:pt x="98" y="5838"/>
-                </a:lnTo>
-                <a:lnTo>
-                  <a:pt x="49" y="6179"/>
-                </a:lnTo>
-                <a:lnTo>
-                  <a:pt x="1" y="6521"/>
-                </a:lnTo>
-                <a:lnTo>
-                  <a:pt x="1" y="6888"/>
-                </a:lnTo>
-                <a:lnTo>
-                  <a:pt x="1" y="7254"/>
-                </a:lnTo>
-                <a:lnTo>
-                  <a:pt x="49" y="7645"/>
-                </a:lnTo>
-                <a:lnTo>
-                  <a:pt x="98" y="8011"/>
-                </a:lnTo>
-                <a:lnTo>
-                  <a:pt x="196" y="8353"/>
-                </a:lnTo>
-                <a:lnTo>
-                  <a:pt x="294" y="8719"/>
-                </a:lnTo>
-                <a:lnTo>
-                  <a:pt x="416" y="9061"/>
-                </a:lnTo>
-                <a:lnTo>
-                  <a:pt x="562" y="9403"/>
-                </a:lnTo>
-                <a:lnTo>
-                  <a:pt x="733" y="9745"/>
-                </a:lnTo>
-                <a:lnTo>
-                  <a:pt x="904" y="10063"/>
-                </a:lnTo>
-                <a:lnTo>
-                  <a:pt x="1100" y="10356"/>
-                </a:lnTo>
-                <a:lnTo>
-                  <a:pt x="1344" y="10673"/>
-                </a:lnTo>
-                <a:lnTo>
-                  <a:pt x="1564" y="10966"/>
-                </a:lnTo>
-                <a:lnTo>
-                  <a:pt x="1832" y="11235"/>
-                </a:lnTo>
-                <a:lnTo>
-                  <a:pt x="2101" y="11504"/>
-                </a:lnTo>
-                <a:lnTo>
-                  <a:pt x="2394" y="11772"/>
-                </a:lnTo>
-                <a:lnTo>
-                  <a:pt x="2687" y="12017"/>
-                </a:lnTo>
-                <a:lnTo>
-                  <a:pt x="2492" y="12383"/>
-                </a:lnTo>
-                <a:lnTo>
-                  <a:pt x="2272" y="12749"/>
-                </a:lnTo>
-                <a:lnTo>
-                  <a:pt x="2028" y="13140"/>
-                </a:lnTo>
-                <a:lnTo>
-                  <a:pt x="1710" y="13506"/>
-                </a:lnTo>
-                <a:lnTo>
-                  <a:pt x="1368" y="13873"/>
-                </a:lnTo>
-                <a:lnTo>
-                  <a:pt x="1173" y="14044"/>
-                </a:lnTo>
-                <a:lnTo>
-                  <a:pt x="953" y="14190"/>
-                </a:lnTo>
-                <a:lnTo>
-                  <a:pt x="733" y="14337"/>
-                </a:lnTo>
-                <a:lnTo>
-                  <a:pt x="513" y="14483"/>
-                </a:lnTo>
-                <a:lnTo>
-                  <a:pt x="269" y="14581"/>
-                </a:lnTo>
-                <a:lnTo>
-                  <a:pt x="1" y="14703"/>
-                </a:lnTo>
-                <a:lnTo>
-                  <a:pt x="123" y="14703"/>
-                </a:lnTo>
-                <a:lnTo>
-                  <a:pt x="489" y="14752"/>
-                </a:lnTo>
-                <a:lnTo>
-                  <a:pt x="1368" y="14752"/>
-                </a:lnTo>
-                <a:lnTo>
-                  <a:pt x="1710" y="14728"/>
-                </a:lnTo>
-                <a:lnTo>
-                  <a:pt x="2101" y="14654"/>
-                </a:lnTo>
-                <a:lnTo>
-                  <a:pt x="2492" y="14581"/>
-                </a:lnTo>
-                <a:lnTo>
-                  <a:pt x="2907" y="14459"/>
-                </a:lnTo>
-                <a:lnTo>
-                  <a:pt x="3322" y="14312"/>
-                </a:lnTo>
-                <a:lnTo>
-                  <a:pt x="3762" y="14117"/>
-                </a:lnTo>
-                <a:lnTo>
-                  <a:pt x="4177" y="13873"/>
-                </a:lnTo>
-                <a:lnTo>
-                  <a:pt x="4592" y="13604"/>
-                </a:lnTo>
-                <a:lnTo>
-                  <a:pt x="4983" y="13238"/>
-                </a:lnTo>
-                <a:lnTo>
-                  <a:pt x="5349" y="13360"/>
-                </a:lnTo>
-                <a:lnTo>
-                  <a:pt x="5716" y="13482"/>
-                </a:lnTo>
-                <a:lnTo>
-                  <a:pt x="6106" y="13555"/>
-                </a:lnTo>
-                <a:lnTo>
-                  <a:pt x="6497" y="13628"/>
-                </a:lnTo>
-                <a:lnTo>
-                  <a:pt x="6888" y="13702"/>
-                </a:lnTo>
-                <a:lnTo>
-                  <a:pt x="7279" y="13751"/>
-                </a:lnTo>
-                <a:lnTo>
-                  <a:pt x="7694" y="13775"/>
-                </a:lnTo>
-                <a:lnTo>
-                  <a:pt x="8524" y="13775"/>
-                </a:lnTo>
-                <a:lnTo>
-                  <a:pt x="8939" y="13751"/>
-                </a:lnTo>
-                <a:lnTo>
-                  <a:pt x="9355" y="13702"/>
-                </a:lnTo>
-                <a:lnTo>
-                  <a:pt x="9745" y="13628"/>
-                </a:lnTo>
-                <a:lnTo>
-                  <a:pt x="10136" y="13555"/>
-                </a:lnTo>
-                <a:lnTo>
-                  <a:pt x="10527" y="13458"/>
-                </a:lnTo>
-                <a:lnTo>
-                  <a:pt x="10893" y="13360"/>
-                </a:lnTo>
-                <a:lnTo>
-                  <a:pt x="11260" y="13238"/>
-                </a:lnTo>
-                <a:lnTo>
-                  <a:pt x="11626" y="13091"/>
-                </a:lnTo>
-                <a:lnTo>
-                  <a:pt x="11968" y="12945"/>
-                </a:lnTo>
-                <a:lnTo>
-                  <a:pt x="12310" y="12774"/>
-                </a:lnTo>
-                <a:lnTo>
-                  <a:pt x="12652" y="12603"/>
-                </a:lnTo>
-                <a:lnTo>
-                  <a:pt x="12969" y="12407"/>
-                </a:lnTo>
-                <a:lnTo>
-                  <a:pt x="13262" y="12212"/>
-                </a:lnTo>
-                <a:lnTo>
-                  <a:pt x="13555" y="11992"/>
-                </a:lnTo>
-                <a:lnTo>
-                  <a:pt x="13848" y="11748"/>
-                </a:lnTo>
-                <a:lnTo>
-                  <a:pt x="14117" y="11528"/>
-                </a:lnTo>
-                <a:lnTo>
-                  <a:pt x="14361" y="11259"/>
-                </a:lnTo>
-                <a:lnTo>
-                  <a:pt x="14606" y="11015"/>
-                </a:lnTo>
-                <a:lnTo>
-                  <a:pt x="14825" y="10747"/>
-                </a:lnTo>
-                <a:lnTo>
-                  <a:pt x="15045" y="10453"/>
-                </a:lnTo>
-                <a:lnTo>
-                  <a:pt x="15241" y="10160"/>
-                </a:lnTo>
-                <a:lnTo>
-                  <a:pt x="15412" y="9867"/>
-                </a:lnTo>
-                <a:lnTo>
-                  <a:pt x="15582" y="9574"/>
-                </a:lnTo>
-                <a:lnTo>
-                  <a:pt x="15729" y="9257"/>
-                </a:lnTo>
-                <a:lnTo>
-                  <a:pt x="15851" y="8939"/>
-                </a:lnTo>
-                <a:lnTo>
-                  <a:pt x="15973" y="8597"/>
-                </a:lnTo>
-                <a:lnTo>
-                  <a:pt x="16047" y="8280"/>
-                </a:lnTo>
-                <a:lnTo>
-                  <a:pt x="16120" y="7938"/>
-                </a:lnTo>
-                <a:lnTo>
-                  <a:pt x="16169" y="7596"/>
-                </a:lnTo>
-                <a:lnTo>
-                  <a:pt x="16217" y="7230"/>
-                </a:lnTo>
-                <a:lnTo>
-                  <a:pt x="16217" y="6888"/>
-                </a:lnTo>
-                <a:lnTo>
-                  <a:pt x="16217" y="6521"/>
-                </a:lnTo>
-                <a:lnTo>
-                  <a:pt x="16169" y="6179"/>
-                </a:lnTo>
-                <a:lnTo>
-                  <a:pt x="16120" y="5838"/>
-                </a:lnTo>
-                <a:lnTo>
-                  <a:pt x="16047" y="5496"/>
-                </a:lnTo>
-                <a:lnTo>
-                  <a:pt x="15973" y="5154"/>
-                </a:lnTo>
-                <a:lnTo>
-                  <a:pt x="15851" y="4836"/>
-                </a:lnTo>
-                <a:lnTo>
-                  <a:pt x="15729" y="4519"/>
-                </a:lnTo>
-                <a:lnTo>
-                  <a:pt x="15582" y="4201"/>
-                </a:lnTo>
-                <a:lnTo>
-                  <a:pt x="15412" y="3884"/>
-                </a:lnTo>
-                <a:lnTo>
-                  <a:pt x="15241" y="3591"/>
-                </a:lnTo>
-                <a:lnTo>
-                  <a:pt x="15045" y="3298"/>
-                </a:lnTo>
-                <a:lnTo>
-                  <a:pt x="14825" y="3029"/>
-                </a:lnTo>
-                <a:lnTo>
-                  <a:pt x="14606" y="2760"/>
-                </a:lnTo>
-                <a:lnTo>
-                  <a:pt x="14361" y="2492"/>
-                </a:lnTo>
-                <a:lnTo>
-                  <a:pt x="14117" y="2247"/>
-                </a:lnTo>
-                <a:lnTo>
-                  <a:pt x="13848" y="2003"/>
-                </a:lnTo>
-                <a:lnTo>
-                  <a:pt x="13555" y="1783"/>
-                </a:lnTo>
-                <a:lnTo>
-                  <a:pt x="13262" y="1563"/>
-                </a:lnTo>
-                <a:lnTo>
-                  <a:pt x="12969" y="1368"/>
-                </a:lnTo>
-                <a:lnTo>
-                  <a:pt x="12652" y="1173"/>
-                </a:lnTo>
-                <a:lnTo>
-                  <a:pt x="12310" y="977"/>
-                </a:lnTo>
-                <a:lnTo>
-                  <a:pt x="11968" y="831"/>
-                </a:lnTo>
-                <a:lnTo>
-                  <a:pt x="11626" y="660"/>
-                </a:lnTo>
-                <a:lnTo>
-                  <a:pt x="11260" y="538"/>
-                </a:lnTo>
-                <a:lnTo>
-                  <a:pt x="10893" y="416"/>
-                </a:lnTo>
-                <a:lnTo>
-                  <a:pt x="10527" y="293"/>
-                </a:lnTo>
-                <a:lnTo>
-                  <a:pt x="10136" y="196"/>
-                </a:lnTo>
-                <a:lnTo>
-                  <a:pt x="9745" y="123"/>
-                </a:lnTo>
-                <a:lnTo>
-                  <a:pt x="9355" y="74"/>
-                </a:lnTo>
-                <a:lnTo>
-                  <a:pt x="8939" y="25"/>
-                </a:lnTo>
-                <a:lnTo>
-                  <a:pt x="8524" y="0"/>
-                </a:lnTo>
-                <a:close/>
-              </a:path>
-            </a:pathLst>
-          </a:custGeom>
-          <a:solidFill>
-            <a:srgbClr val="3F4145"/>
-          </a:solidFill>
-          <a:ln>
-            <a:noFill/>
-          </a:ln>
-        </p:spPr>
-        <p:txBody>
-          <a:bodyPr anchorCtr="0" anchor="ctr" bIns="91425" lIns="91425" spcFirstLastPara="1" rIns="91425" wrap="square" tIns="91425">
-            <a:noAutofit/>
-          </a:bodyPr>
-          <a:lstStyle/>
-          <a:p>
-            <a:pPr indent="0" lvl="0" marL="0" rtl="0" algn="l">
-              <a:spcBef>
-                <a:spcPts val="0"/>
-              </a:spcBef>
-              <a:spcAft>
-                <a:spcPts val="0"/>
-              </a:spcAft>
-              <a:buNone/>
-            </a:pPr>
-            <a:r>
-              <a:t/>
-            </a:r>
-            <a:endParaRPr/>
-          </a:p>
-        </p:txBody>
-      </p:sp>
       <p:cxnSp>
         <p:nvCxnSpPr>
-          <p:cNvPr id="247" name="Google Shape;247;p31"/>
+          <p:cNvPr id="246" name="Google Shape;246;p31"/>
           <p:cNvCxnSpPr/>
           <p:nvPr/>
         </p:nvCxnSpPr>
         <p:spPr>
           <a:xfrm>
-            <a:off x="447192" y="2224672"/>
+            <a:off x="410842" y="1769797"/>
             <a:ext cx="694200" cy="0"/>
           </a:xfrm>
           <a:prstGeom prst="straightConnector1">
@@ -12339,6 +12241,33 @@
           </a:ln>
         </p:spPr>
       </p:cxnSp>
+      <p:pic>
+        <p:nvPicPr>
+          <p:cNvPr id="247" name="Google Shape;247;p31"/>
+          <p:cNvPicPr preferRelativeResize="0"/>
+          <p:nvPr/>
+        </p:nvPicPr>
+        <p:blipFill rotWithShape="1">
+          <a:blip r:embed="rId3">
+            <a:alphaModFix/>
+          </a:blip>
+          <a:srcRect b="820" l="0" r="55685" t="-820"/>
+          <a:stretch/>
+        </p:blipFill>
+        <p:spPr>
+          <a:xfrm>
+            <a:off x="4572000" y="-125"/>
+            <a:ext cx="4572001" cy="5143502"/>
+          </a:xfrm>
+          <a:prstGeom prst="rect">
+            <a:avLst/>
+          </a:prstGeom>
+          <a:noFill/>
+          <a:ln>
+            <a:noFill/>
+          </a:ln>
+        </p:spPr>
+      </p:pic>
     </p:spTree>
   </p:cSld>
   <p:clrMapOvr>
@@ -12884,6 +12813,1181 @@
           </a:ln>
         </p:spPr>
       </p:pic>
+    </p:spTree>
+  </p:cSld>
+  <p:clrMapOvr>
+    <a:masterClrMapping/>
+  </p:clrMapOvr>
+</p:sld>
+</file>
+
+<file path=ppt/slides/slide20.xml><?xml version="1.0" encoding="utf-8"?>
+<p:sld xmlns:a="http://schemas.openxmlformats.org/drawingml/2006/main" xmlns:r="http://schemas.openxmlformats.org/officeDocument/2006/relationships" xmlns:mc="http://schemas.openxmlformats.org/markup-compatibility/2006" xmlns:mv="urn:schemas-microsoft-com:mac:vml" xmlns:p="http://schemas.openxmlformats.org/presentationml/2006/main" xmlns:c="http://schemas.openxmlformats.org/drawingml/2006/chart" xmlns:dgm="http://schemas.openxmlformats.org/drawingml/2006/diagram" xmlns:o="urn:schemas-microsoft-com:office:office" xmlns:v="urn:schemas-microsoft-com:vml" xmlns:pvml="urn:schemas-microsoft-com:office:powerpoint" xmlns:com="http://schemas.openxmlformats.org/drawingml/2006/compatibility" xmlns:p14="http://schemas.microsoft.com/office/powerpoint/2010/main" xmlns:p15="http://schemas.microsoft.com/office/powerpoint/2012/main" xmlns:ahyp="http://schemas.microsoft.com/office/drawing/2018/hyperlinkcolor">
+  <p:cSld>
+    <p:bg>
+      <p:bgPr>
+        <a:solidFill>
+          <a:srgbClr val="202125"/>
+        </a:solidFill>
+      </p:bgPr>
+    </p:bg>
+    <p:spTree>
+      <p:nvGrpSpPr>
+        <p:cNvPr id="251" name="Shape 251"/>
+        <p:cNvGrpSpPr/>
+        <p:nvPr/>
+      </p:nvGrpSpPr>
+      <p:grpSpPr>
+        <a:xfrm>
+          <a:off x="0" y="0"/>
+          <a:ext cx="0" cy="0"/>
+          <a:chOff x="0" y="0"/>
+          <a:chExt cx="0" cy="0"/>
+        </a:xfrm>
+      </p:grpSpPr>
+      <p:sp>
+        <p:nvSpPr>
+          <p:cNvPr id="252" name="Google Shape;252;p32"/>
+          <p:cNvSpPr/>
+          <p:nvPr/>
+        </p:nvSpPr>
+        <p:spPr>
+          <a:xfrm>
+            <a:off x="4572000" y="-125"/>
+            <a:ext cx="4572000" cy="5143500"/>
+          </a:xfrm>
+          <a:prstGeom prst="rect">
+            <a:avLst/>
+          </a:prstGeom>
+          <a:solidFill>
+            <a:srgbClr val="D1D3DB"/>
+          </a:solidFill>
+          <a:ln>
+            <a:noFill/>
+          </a:ln>
+        </p:spPr>
+        <p:txBody>
+          <a:bodyPr anchorCtr="0" anchor="ctr" bIns="91425" lIns="91425" spcFirstLastPara="1" rIns="91425" wrap="square" tIns="91425">
+            <a:noAutofit/>
+          </a:bodyPr>
+          <a:lstStyle/>
+          <a:p>
+            <a:pPr indent="0" lvl="0" marL="0" rtl="0" algn="l">
+              <a:spcBef>
+                <a:spcPts val="0"/>
+              </a:spcBef>
+              <a:spcAft>
+                <a:spcPts val="0"/>
+              </a:spcAft>
+              <a:buNone/>
+            </a:pPr>
+            <a:r>
+              <a:t/>
+            </a:r>
+            <a:endParaRPr/>
+          </a:p>
+        </p:txBody>
+      </p:sp>
+      <p:sp>
+        <p:nvSpPr>
+          <p:cNvPr id="253" name="Google Shape;253;p32"/>
+          <p:cNvSpPr txBox="1"/>
+          <p:nvPr/>
+        </p:nvSpPr>
+        <p:spPr>
+          <a:xfrm>
+            <a:off x="447196" y="577200"/>
+            <a:ext cx="3676200" cy="277200"/>
+          </a:xfrm>
+          <a:prstGeom prst="rect">
+            <a:avLst/>
+          </a:prstGeom>
+          <a:noFill/>
+          <a:ln>
+            <a:noFill/>
+          </a:ln>
+        </p:spPr>
+        <p:txBody>
+          <a:bodyPr anchorCtr="0" anchor="t" bIns="0" lIns="0" spcFirstLastPara="1" rIns="0" wrap="square" tIns="0">
+            <a:spAutoFit/>
+          </a:bodyPr>
+          <a:lstStyle/>
+          <a:p>
+            <a:pPr indent="0" lvl="0" marL="0" marR="0" rtl="0" algn="l">
+              <a:lnSpc>
+                <a:spcPct val="120000"/>
+              </a:lnSpc>
+              <a:spcBef>
+                <a:spcPts val="0"/>
+              </a:spcBef>
+              <a:spcAft>
+                <a:spcPts val="0"/>
+              </a:spcAft>
+              <a:buClr>
+                <a:srgbClr val="F6F9FF"/>
+              </a:buClr>
+              <a:buSzPts val="5000"/>
+              <a:buFont typeface="Poppins"/>
+              <a:buNone/>
+            </a:pPr>
+            <a:r>
+              <a:rPr b="1" lang="fr" sz="1800">
+                <a:solidFill>
+                  <a:srgbClr val="FF3266"/>
+                </a:solidFill>
+                <a:latin typeface="Poppins"/>
+                <a:ea typeface="Poppins"/>
+                <a:cs typeface="Poppins"/>
+                <a:sym typeface="Poppins"/>
+              </a:rPr>
+              <a:t>Doc</a:t>
+            </a:r>
+            <a:r>
+              <a:rPr b="1" lang="fr" sz="1800">
+                <a:solidFill>
+                  <a:srgbClr val="F6F9FF"/>
+                </a:solidFill>
+                <a:latin typeface="Poppins"/>
+                <a:ea typeface="Poppins"/>
+                <a:cs typeface="Poppins"/>
+                <a:sym typeface="Poppins"/>
+              </a:rPr>
+              <a:t>umentations</a:t>
+            </a:r>
+            <a:endParaRPr sz="1800">
+              <a:latin typeface="Poppins"/>
+              <a:ea typeface="Poppins"/>
+              <a:cs typeface="Poppins"/>
+              <a:sym typeface="Poppins"/>
+            </a:endParaRPr>
+          </a:p>
+        </p:txBody>
+      </p:sp>
+      <p:sp>
+        <p:nvSpPr>
+          <p:cNvPr id="254" name="Google Shape;254;p32"/>
+          <p:cNvSpPr txBox="1"/>
+          <p:nvPr/>
+        </p:nvSpPr>
+        <p:spPr>
+          <a:xfrm>
+            <a:off x="447199" y="1604750"/>
+            <a:ext cx="3676200" cy="738900"/>
+          </a:xfrm>
+          <a:prstGeom prst="rect">
+            <a:avLst/>
+          </a:prstGeom>
+          <a:noFill/>
+          <a:ln>
+            <a:noFill/>
+          </a:ln>
+        </p:spPr>
+        <p:txBody>
+          <a:bodyPr anchorCtr="0" anchor="t" bIns="0" lIns="0" spcFirstLastPara="1" rIns="0" wrap="square" tIns="0">
+            <a:spAutoFit/>
+          </a:bodyPr>
+          <a:lstStyle/>
+          <a:p>
+            <a:pPr indent="0" lvl="0" marL="0" marR="0" rtl="0" algn="l">
+              <a:lnSpc>
+                <a:spcPct val="150000"/>
+              </a:lnSpc>
+              <a:spcBef>
+                <a:spcPts val="0"/>
+              </a:spcBef>
+              <a:spcAft>
+                <a:spcPts val="0"/>
+              </a:spcAft>
+              <a:buClr>
+                <a:srgbClr val="C8CBD1"/>
+              </a:buClr>
+              <a:buSzPts val="1800"/>
+              <a:buFont typeface="Poppins Light"/>
+              <a:buNone/>
+            </a:pPr>
+            <a:r>
+              <a:rPr lang="fr" sz="1200">
+                <a:solidFill>
+                  <a:srgbClr val="C8CBD1"/>
+                </a:solidFill>
+                <a:latin typeface="Poppins Light"/>
+                <a:ea typeface="Poppins Light"/>
+                <a:cs typeface="Poppins Light"/>
+                <a:sym typeface="Poppins Light"/>
+              </a:rPr>
+              <a:t>Dans le répertoire </a:t>
+            </a:r>
+            <a:r>
+              <a:rPr b="1" lang="fr" sz="1200">
+                <a:solidFill>
+                  <a:srgbClr val="C8CBD1"/>
+                </a:solidFill>
+                <a:latin typeface="Poppins"/>
+                <a:ea typeface="Poppins"/>
+                <a:cs typeface="Poppins"/>
+                <a:sym typeface="Poppins"/>
+              </a:rPr>
+              <a:t>docs</a:t>
+            </a:r>
+            <a:r>
+              <a:rPr lang="fr" sz="1200">
+                <a:solidFill>
+                  <a:srgbClr val="C8CBD1"/>
+                </a:solidFill>
+                <a:latin typeface="Poppins Light"/>
+                <a:ea typeface="Poppins Light"/>
+                <a:cs typeface="Poppins Light"/>
+                <a:sym typeface="Poppins Light"/>
+              </a:rPr>
+              <a:t> on trouve les différentes documentations (référentiel) au format Markdown.</a:t>
+            </a:r>
+            <a:endParaRPr sz="1200">
+              <a:solidFill>
+                <a:srgbClr val="C8CBD1"/>
+              </a:solidFill>
+              <a:latin typeface="Poppins Light"/>
+              <a:ea typeface="Poppins Light"/>
+              <a:cs typeface="Poppins Light"/>
+              <a:sym typeface="Poppins Light"/>
+            </a:endParaRPr>
+          </a:p>
+        </p:txBody>
+      </p:sp>
+      <p:sp>
+        <p:nvSpPr>
+          <p:cNvPr id="255" name="Google Shape;255;p32"/>
+          <p:cNvSpPr txBox="1"/>
+          <p:nvPr/>
+        </p:nvSpPr>
+        <p:spPr>
+          <a:xfrm>
+            <a:off x="123075" y="2673325"/>
+            <a:ext cx="4152000" cy="2077200"/>
+          </a:xfrm>
+          <a:prstGeom prst="rect">
+            <a:avLst/>
+          </a:prstGeom>
+          <a:noFill/>
+          <a:ln>
+            <a:noFill/>
+          </a:ln>
+        </p:spPr>
+        <p:txBody>
+          <a:bodyPr anchorCtr="0" anchor="t" bIns="91425" lIns="91425" spcFirstLastPara="1" rIns="91425" wrap="square" tIns="91425">
+            <a:noAutofit/>
+          </a:bodyPr>
+          <a:lstStyle/>
+          <a:p>
+            <a:pPr indent="-304800" lvl="0" marL="457200" rtl="0" algn="l">
+              <a:lnSpc>
+                <a:spcPct val="150000"/>
+              </a:lnSpc>
+              <a:spcBef>
+                <a:spcPts val="0"/>
+              </a:spcBef>
+              <a:spcAft>
+                <a:spcPts val="0"/>
+              </a:spcAft>
+              <a:buClr>
+                <a:srgbClr val="404145"/>
+              </a:buClr>
+              <a:buSzPts val="1200"/>
+              <a:buChar char="●"/>
+            </a:pPr>
+            <a:r>
+              <a:rPr b="1" lang="fr" sz="1200">
+                <a:solidFill>
+                  <a:srgbClr val="F6F9FF"/>
+                </a:solidFill>
+                <a:latin typeface="Poppins"/>
+                <a:ea typeface="Poppins"/>
+                <a:cs typeface="Poppins"/>
+                <a:sym typeface="Poppins"/>
+              </a:rPr>
+              <a:t>STRUCTURE.md </a:t>
+            </a:r>
+            <a:r>
+              <a:rPr lang="fr" sz="1200">
+                <a:solidFill>
+                  <a:srgbClr val="F6F9FF"/>
+                </a:solidFill>
+                <a:latin typeface="Poppins Light"/>
+                <a:ea typeface="Poppins Light"/>
+                <a:cs typeface="Poppins Light"/>
+                <a:sym typeface="Poppins Light"/>
+              </a:rPr>
+              <a:t>: </a:t>
+            </a:r>
+            <a:r>
+              <a:rPr lang="fr" sz="1200">
+                <a:solidFill>
+                  <a:srgbClr val="C8CBD1"/>
+                </a:solidFill>
+                <a:latin typeface="Poppins Light"/>
+                <a:ea typeface="Poppins Light"/>
+                <a:cs typeface="Poppins Light"/>
+                <a:sym typeface="Poppins Light"/>
+              </a:rPr>
+              <a:t>description des différents fichiers et répertoires.</a:t>
+            </a:r>
+            <a:endParaRPr sz="1200">
+              <a:solidFill>
+                <a:srgbClr val="C8CBD1"/>
+              </a:solidFill>
+              <a:latin typeface="Poppins Light"/>
+              <a:ea typeface="Poppins Light"/>
+              <a:cs typeface="Poppins Light"/>
+              <a:sym typeface="Poppins Light"/>
+            </a:endParaRPr>
+          </a:p>
+          <a:p>
+            <a:pPr indent="-304800" lvl="0" marL="457200" rtl="0" algn="l">
+              <a:lnSpc>
+                <a:spcPct val="150000"/>
+              </a:lnSpc>
+              <a:spcBef>
+                <a:spcPts val="0"/>
+              </a:spcBef>
+              <a:spcAft>
+                <a:spcPts val="0"/>
+              </a:spcAft>
+              <a:buClr>
+                <a:srgbClr val="404145"/>
+              </a:buClr>
+              <a:buSzPts val="1200"/>
+              <a:buChar char="●"/>
+            </a:pPr>
+            <a:r>
+              <a:rPr b="1" lang="fr" sz="1200">
+                <a:solidFill>
+                  <a:srgbClr val="F6F9FF"/>
+                </a:solidFill>
+                <a:latin typeface="Poppins"/>
+                <a:ea typeface="Poppins"/>
+                <a:cs typeface="Poppins"/>
+                <a:sym typeface="Poppins"/>
+              </a:rPr>
+              <a:t>DATABASE.md</a:t>
+            </a:r>
+            <a:r>
+              <a:rPr lang="fr" sz="1200">
+                <a:solidFill>
+                  <a:srgbClr val="F6F9FF"/>
+                </a:solidFill>
+                <a:latin typeface="Poppins Light"/>
+                <a:ea typeface="Poppins Light"/>
+                <a:cs typeface="Poppins Light"/>
+                <a:sym typeface="Poppins Light"/>
+              </a:rPr>
+              <a:t> : </a:t>
+            </a:r>
+            <a:r>
+              <a:rPr lang="fr" sz="1200">
+                <a:solidFill>
+                  <a:srgbClr val="C8CBD1"/>
+                </a:solidFill>
+                <a:latin typeface="Poppins Light"/>
+                <a:ea typeface="Poppins Light"/>
+                <a:cs typeface="Poppins Light"/>
+                <a:sym typeface="Poppins Light"/>
+              </a:rPr>
+              <a:t>documentation sur la base de données.</a:t>
+            </a:r>
+            <a:endParaRPr sz="1200">
+              <a:solidFill>
+                <a:srgbClr val="C8CBD1"/>
+              </a:solidFill>
+              <a:latin typeface="Poppins Light"/>
+              <a:ea typeface="Poppins Light"/>
+              <a:cs typeface="Poppins Light"/>
+              <a:sym typeface="Poppins Light"/>
+            </a:endParaRPr>
+          </a:p>
+          <a:p>
+            <a:pPr indent="-304800" lvl="0" marL="457200" rtl="0" algn="l">
+              <a:lnSpc>
+                <a:spcPct val="150000"/>
+              </a:lnSpc>
+              <a:spcBef>
+                <a:spcPts val="0"/>
+              </a:spcBef>
+              <a:spcAft>
+                <a:spcPts val="0"/>
+              </a:spcAft>
+              <a:buClr>
+                <a:srgbClr val="404145"/>
+              </a:buClr>
+              <a:buSzPts val="1200"/>
+              <a:buChar char="●"/>
+            </a:pPr>
+            <a:r>
+              <a:rPr b="1" lang="fr" sz="1200">
+                <a:solidFill>
+                  <a:srgbClr val="F6F9FF"/>
+                </a:solidFill>
+                <a:latin typeface="Poppins"/>
+                <a:ea typeface="Poppins"/>
+                <a:cs typeface="Poppins"/>
+                <a:sym typeface="Poppins"/>
+              </a:rPr>
+              <a:t>FUNCTION.md</a:t>
+            </a:r>
+            <a:r>
+              <a:rPr lang="fr" sz="1200">
+                <a:solidFill>
+                  <a:srgbClr val="F6F9FF"/>
+                </a:solidFill>
+                <a:latin typeface="Poppins Light"/>
+                <a:ea typeface="Poppins Light"/>
+                <a:cs typeface="Poppins Light"/>
+                <a:sym typeface="Poppins Light"/>
+              </a:rPr>
+              <a:t> : </a:t>
+            </a:r>
+            <a:r>
+              <a:rPr lang="fr" sz="1200">
+                <a:solidFill>
+                  <a:srgbClr val="C8CBD1"/>
+                </a:solidFill>
+                <a:latin typeface="Poppins Light"/>
+                <a:ea typeface="Poppins Light"/>
+                <a:cs typeface="Poppins Light"/>
+                <a:sym typeface="Poppins Light"/>
+              </a:rPr>
+              <a:t>documentation détaillée sur les fonctions utilisées sur le site.</a:t>
+            </a:r>
+            <a:endParaRPr sz="1200">
+              <a:solidFill>
+                <a:srgbClr val="C8CBD1"/>
+              </a:solidFill>
+              <a:latin typeface="Poppins Light"/>
+              <a:ea typeface="Poppins Light"/>
+              <a:cs typeface="Poppins Light"/>
+              <a:sym typeface="Poppins Light"/>
+            </a:endParaRPr>
+          </a:p>
+        </p:txBody>
+      </p:sp>
+      <p:cxnSp>
+        <p:nvCxnSpPr>
+          <p:cNvPr id="256" name="Google Shape;256;p32"/>
+          <p:cNvCxnSpPr/>
+          <p:nvPr/>
+        </p:nvCxnSpPr>
+        <p:spPr>
+          <a:xfrm>
+            <a:off x="447192" y="1230772"/>
+            <a:ext cx="694200" cy="0"/>
+          </a:xfrm>
+          <a:prstGeom prst="straightConnector1">
+            <a:avLst/>
+          </a:prstGeom>
+          <a:noFill/>
+          <a:ln cap="flat" cmpd="sng" w="25400">
+            <a:solidFill>
+              <a:srgbClr val="393A3F"/>
+            </a:solidFill>
+            <a:prstDash val="solid"/>
+            <a:miter lim="400000"/>
+            <a:headEnd len="sm" w="sm" type="none"/>
+            <a:tailEnd len="sm" w="sm" type="none"/>
+          </a:ln>
+        </p:spPr>
+      </p:cxnSp>
+      <p:pic>
+        <p:nvPicPr>
+          <p:cNvPr id="257" name="Google Shape;257;p32"/>
+          <p:cNvPicPr preferRelativeResize="0"/>
+          <p:nvPr/>
+        </p:nvPicPr>
+        <p:blipFill rotWithShape="1">
+          <a:blip r:embed="rId3">
+            <a:alphaModFix/>
+          </a:blip>
+          <a:srcRect b="2210" l="0" r="55818" t="0"/>
+          <a:stretch/>
+        </p:blipFill>
+        <p:spPr>
+          <a:xfrm>
+            <a:off x="4572000" y="-125"/>
+            <a:ext cx="4572001" cy="5143500"/>
+          </a:xfrm>
+          <a:prstGeom prst="rect">
+            <a:avLst/>
+          </a:prstGeom>
+          <a:noFill/>
+          <a:ln>
+            <a:noFill/>
+          </a:ln>
+        </p:spPr>
+      </p:pic>
+    </p:spTree>
+  </p:cSld>
+  <p:clrMapOvr>
+    <a:masterClrMapping/>
+  </p:clrMapOvr>
+</p:sld>
+</file>
+
+<file path=ppt/slides/slide21.xml><?xml version="1.0" encoding="utf-8"?>
+<p:sld xmlns:a="http://schemas.openxmlformats.org/drawingml/2006/main" xmlns:r="http://schemas.openxmlformats.org/officeDocument/2006/relationships" xmlns:mc="http://schemas.openxmlformats.org/markup-compatibility/2006" xmlns:mv="urn:schemas-microsoft-com:mac:vml" xmlns:p="http://schemas.openxmlformats.org/presentationml/2006/main" xmlns:c="http://schemas.openxmlformats.org/drawingml/2006/chart" xmlns:dgm="http://schemas.openxmlformats.org/drawingml/2006/diagram" xmlns:o="urn:schemas-microsoft-com:office:office" xmlns:v="urn:schemas-microsoft-com:vml" xmlns:pvml="urn:schemas-microsoft-com:office:powerpoint" xmlns:com="http://schemas.openxmlformats.org/drawingml/2006/compatibility" xmlns:p14="http://schemas.microsoft.com/office/powerpoint/2010/main" xmlns:p15="http://schemas.microsoft.com/office/powerpoint/2012/main" xmlns:ahyp="http://schemas.microsoft.com/office/drawing/2018/hyperlinkcolor">
+  <p:cSld>
+    <p:bg>
+      <p:bgPr>
+        <a:solidFill>
+          <a:srgbClr val="202125"/>
+        </a:solidFill>
+      </p:bgPr>
+    </p:bg>
+    <p:spTree>
+      <p:nvGrpSpPr>
+        <p:cNvPr id="261" name="Shape 261"/>
+        <p:cNvGrpSpPr/>
+        <p:nvPr/>
+      </p:nvGrpSpPr>
+      <p:grpSpPr>
+        <a:xfrm>
+          <a:off x="0" y="0"/>
+          <a:ext cx="0" cy="0"/>
+          <a:chOff x="0" y="0"/>
+          <a:chExt cx="0" cy="0"/>
+        </a:xfrm>
+      </p:grpSpPr>
+      <p:sp>
+        <p:nvSpPr>
+          <p:cNvPr id="262" name="Google Shape;262;p33"/>
+          <p:cNvSpPr txBox="1"/>
+          <p:nvPr/>
+        </p:nvSpPr>
+        <p:spPr>
+          <a:xfrm>
+            <a:off x="447200" y="658425"/>
+            <a:ext cx="3947100" cy="1219200"/>
+          </a:xfrm>
+          <a:prstGeom prst="rect">
+            <a:avLst/>
+          </a:prstGeom>
+          <a:noFill/>
+          <a:ln>
+            <a:noFill/>
+          </a:ln>
+        </p:spPr>
+        <p:txBody>
+          <a:bodyPr anchorCtr="0" anchor="t" bIns="0" lIns="0" spcFirstLastPara="1" rIns="0" wrap="square" tIns="0">
+            <a:spAutoFit/>
+          </a:bodyPr>
+          <a:lstStyle/>
+          <a:p>
+            <a:pPr indent="0" lvl="0" marL="0" marR="0" rtl="0" algn="l">
+              <a:lnSpc>
+                <a:spcPct val="120000"/>
+              </a:lnSpc>
+              <a:spcBef>
+                <a:spcPts val="0"/>
+              </a:spcBef>
+              <a:spcAft>
+                <a:spcPts val="0"/>
+              </a:spcAft>
+              <a:buClr>
+                <a:srgbClr val="F6F9FF"/>
+              </a:buClr>
+              <a:buSzPts val="5000"/>
+              <a:buFont typeface="Poppins"/>
+              <a:buNone/>
+            </a:pPr>
+            <a:r>
+              <a:rPr b="1" lang="fr" sz="3600">
+                <a:solidFill>
+                  <a:srgbClr val="FF3266"/>
+                </a:solidFill>
+                <a:latin typeface="Poppins"/>
+                <a:ea typeface="Poppins"/>
+                <a:cs typeface="Poppins"/>
+                <a:sym typeface="Poppins"/>
+              </a:rPr>
+              <a:t>Merci</a:t>
+            </a:r>
+            <a:r>
+              <a:rPr b="1" lang="fr" sz="3600">
+                <a:solidFill>
+                  <a:srgbClr val="F6F9FF"/>
+                </a:solidFill>
+                <a:latin typeface="Poppins"/>
+                <a:ea typeface="Poppins"/>
+                <a:cs typeface="Poppins"/>
+                <a:sym typeface="Poppins"/>
+              </a:rPr>
+              <a:t> pour votre attention</a:t>
+            </a:r>
+            <a:endParaRPr b="1" sz="3600">
+              <a:latin typeface="Poppins"/>
+              <a:ea typeface="Poppins"/>
+              <a:cs typeface="Poppins"/>
+              <a:sym typeface="Poppins"/>
+            </a:endParaRPr>
+          </a:p>
+        </p:txBody>
+      </p:sp>
+      <p:sp>
+        <p:nvSpPr>
+          <p:cNvPr id="263" name="Google Shape;263;p33"/>
+          <p:cNvSpPr txBox="1"/>
+          <p:nvPr/>
+        </p:nvSpPr>
+        <p:spPr>
+          <a:xfrm>
+            <a:off x="447199" y="3033225"/>
+            <a:ext cx="3676200" cy="554100"/>
+          </a:xfrm>
+          <a:prstGeom prst="rect">
+            <a:avLst/>
+          </a:prstGeom>
+          <a:noFill/>
+          <a:ln>
+            <a:noFill/>
+          </a:ln>
+        </p:spPr>
+        <p:txBody>
+          <a:bodyPr anchorCtr="0" anchor="t" bIns="0" lIns="0" spcFirstLastPara="1" rIns="0" wrap="square" tIns="0">
+            <a:spAutoFit/>
+          </a:bodyPr>
+          <a:lstStyle/>
+          <a:p>
+            <a:pPr indent="0" lvl="0" marL="0" marR="0" rtl="0" algn="l">
+              <a:lnSpc>
+                <a:spcPct val="150000"/>
+              </a:lnSpc>
+              <a:spcBef>
+                <a:spcPts val="0"/>
+              </a:spcBef>
+              <a:spcAft>
+                <a:spcPts val="0"/>
+              </a:spcAft>
+              <a:buClr>
+                <a:srgbClr val="C8CBD1"/>
+              </a:buClr>
+              <a:buSzPts val="1800"/>
+              <a:buFont typeface="Poppins Light"/>
+              <a:buNone/>
+            </a:pPr>
+            <a:r>
+              <a:rPr lang="fr" sz="3600">
+                <a:solidFill>
+                  <a:srgbClr val="C8CBD1"/>
+                </a:solidFill>
+                <a:latin typeface="Poppins Light"/>
+                <a:ea typeface="Poppins Light"/>
+                <a:cs typeface="Poppins Light"/>
+                <a:sym typeface="Poppins Light"/>
+              </a:rPr>
+              <a:t>Des questions ?</a:t>
+            </a:r>
+            <a:endParaRPr sz="3600">
+              <a:latin typeface="Poppins"/>
+              <a:ea typeface="Poppins"/>
+              <a:cs typeface="Poppins"/>
+              <a:sym typeface="Poppins"/>
+            </a:endParaRPr>
+          </a:p>
+        </p:txBody>
+      </p:sp>
+      <p:sp>
+        <p:nvSpPr>
+          <p:cNvPr id="264" name="Google Shape;264;p33"/>
+          <p:cNvSpPr/>
+          <p:nvPr/>
+        </p:nvSpPr>
+        <p:spPr>
+          <a:xfrm>
+            <a:off x="6716334" y="562427"/>
+            <a:ext cx="1827606" cy="1662255"/>
+          </a:xfrm>
+          <a:custGeom>
+            <a:rect b="b" l="l" r="r" t="t"/>
+            <a:pathLst>
+              <a:path extrusionOk="0" h="14752" w="16218">
+                <a:moveTo>
+                  <a:pt x="7694" y="0"/>
+                </a:moveTo>
+                <a:lnTo>
+                  <a:pt x="7279" y="25"/>
+                </a:lnTo>
+                <a:lnTo>
+                  <a:pt x="6863" y="74"/>
+                </a:lnTo>
+                <a:lnTo>
+                  <a:pt x="6473" y="123"/>
+                </a:lnTo>
+                <a:lnTo>
+                  <a:pt x="6082" y="196"/>
+                </a:lnTo>
+                <a:lnTo>
+                  <a:pt x="5691" y="293"/>
+                </a:lnTo>
+                <a:lnTo>
+                  <a:pt x="5325" y="416"/>
+                </a:lnTo>
+                <a:lnTo>
+                  <a:pt x="4958" y="538"/>
+                </a:lnTo>
+                <a:lnTo>
+                  <a:pt x="4592" y="660"/>
+                </a:lnTo>
+                <a:lnTo>
+                  <a:pt x="4250" y="831"/>
+                </a:lnTo>
+                <a:lnTo>
+                  <a:pt x="3908" y="977"/>
+                </a:lnTo>
+                <a:lnTo>
+                  <a:pt x="3566" y="1173"/>
+                </a:lnTo>
+                <a:lnTo>
+                  <a:pt x="3249" y="1368"/>
+                </a:lnTo>
+                <a:lnTo>
+                  <a:pt x="2956" y="1563"/>
+                </a:lnTo>
+                <a:lnTo>
+                  <a:pt x="2663" y="1783"/>
+                </a:lnTo>
+                <a:lnTo>
+                  <a:pt x="2370" y="2003"/>
+                </a:lnTo>
+                <a:lnTo>
+                  <a:pt x="2101" y="2247"/>
+                </a:lnTo>
+                <a:lnTo>
+                  <a:pt x="1857" y="2492"/>
+                </a:lnTo>
+                <a:lnTo>
+                  <a:pt x="1612" y="2760"/>
+                </a:lnTo>
+                <a:lnTo>
+                  <a:pt x="1393" y="3029"/>
+                </a:lnTo>
+                <a:lnTo>
+                  <a:pt x="1173" y="3298"/>
+                </a:lnTo>
+                <a:lnTo>
+                  <a:pt x="977" y="3591"/>
+                </a:lnTo>
+                <a:lnTo>
+                  <a:pt x="807" y="3884"/>
+                </a:lnTo>
+                <a:lnTo>
+                  <a:pt x="636" y="4201"/>
+                </a:lnTo>
+                <a:lnTo>
+                  <a:pt x="489" y="4519"/>
+                </a:lnTo>
+                <a:lnTo>
+                  <a:pt x="367" y="4836"/>
+                </a:lnTo>
+                <a:lnTo>
+                  <a:pt x="245" y="5154"/>
+                </a:lnTo>
+                <a:lnTo>
+                  <a:pt x="172" y="5496"/>
+                </a:lnTo>
+                <a:lnTo>
+                  <a:pt x="98" y="5838"/>
+                </a:lnTo>
+                <a:lnTo>
+                  <a:pt x="49" y="6179"/>
+                </a:lnTo>
+                <a:lnTo>
+                  <a:pt x="1" y="6521"/>
+                </a:lnTo>
+                <a:lnTo>
+                  <a:pt x="1" y="6888"/>
+                </a:lnTo>
+                <a:lnTo>
+                  <a:pt x="1" y="7254"/>
+                </a:lnTo>
+                <a:lnTo>
+                  <a:pt x="49" y="7645"/>
+                </a:lnTo>
+                <a:lnTo>
+                  <a:pt x="98" y="8011"/>
+                </a:lnTo>
+                <a:lnTo>
+                  <a:pt x="196" y="8353"/>
+                </a:lnTo>
+                <a:lnTo>
+                  <a:pt x="294" y="8719"/>
+                </a:lnTo>
+                <a:lnTo>
+                  <a:pt x="416" y="9061"/>
+                </a:lnTo>
+                <a:lnTo>
+                  <a:pt x="562" y="9403"/>
+                </a:lnTo>
+                <a:lnTo>
+                  <a:pt x="733" y="9745"/>
+                </a:lnTo>
+                <a:lnTo>
+                  <a:pt x="904" y="10063"/>
+                </a:lnTo>
+                <a:lnTo>
+                  <a:pt x="1100" y="10356"/>
+                </a:lnTo>
+                <a:lnTo>
+                  <a:pt x="1344" y="10673"/>
+                </a:lnTo>
+                <a:lnTo>
+                  <a:pt x="1564" y="10966"/>
+                </a:lnTo>
+                <a:lnTo>
+                  <a:pt x="1832" y="11235"/>
+                </a:lnTo>
+                <a:lnTo>
+                  <a:pt x="2101" y="11504"/>
+                </a:lnTo>
+                <a:lnTo>
+                  <a:pt x="2394" y="11772"/>
+                </a:lnTo>
+                <a:lnTo>
+                  <a:pt x="2687" y="12017"/>
+                </a:lnTo>
+                <a:lnTo>
+                  <a:pt x="2492" y="12383"/>
+                </a:lnTo>
+                <a:lnTo>
+                  <a:pt x="2272" y="12749"/>
+                </a:lnTo>
+                <a:lnTo>
+                  <a:pt x="2028" y="13140"/>
+                </a:lnTo>
+                <a:lnTo>
+                  <a:pt x="1710" y="13506"/>
+                </a:lnTo>
+                <a:lnTo>
+                  <a:pt x="1368" y="13873"/>
+                </a:lnTo>
+                <a:lnTo>
+                  <a:pt x="1173" y="14044"/>
+                </a:lnTo>
+                <a:lnTo>
+                  <a:pt x="953" y="14190"/>
+                </a:lnTo>
+                <a:lnTo>
+                  <a:pt x="733" y="14337"/>
+                </a:lnTo>
+                <a:lnTo>
+                  <a:pt x="513" y="14483"/>
+                </a:lnTo>
+                <a:lnTo>
+                  <a:pt x="269" y="14581"/>
+                </a:lnTo>
+                <a:lnTo>
+                  <a:pt x="1" y="14703"/>
+                </a:lnTo>
+                <a:lnTo>
+                  <a:pt x="123" y="14703"/>
+                </a:lnTo>
+                <a:lnTo>
+                  <a:pt x="489" y="14752"/>
+                </a:lnTo>
+                <a:lnTo>
+                  <a:pt x="1368" y="14752"/>
+                </a:lnTo>
+                <a:lnTo>
+                  <a:pt x="1710" y="14728"/>
+                </a:lnTo>
+                <a:lnTo>
+                  <a:pt x="2101" y="14654"/>
+                </a:lnTo>
+                <a:lnTo>
+                  <a:pt x="2492" y="14581"/>
+                </a:lnTo>
+                <a:lnTo>
+                  <a:pt x="2907" y="14459"/>
+                </a:lnTo>
+                <a:lnTo>
+                  <a:pt x="3322" y="14312"/>
+                </a:lnTo>
+                <a:lnTo>
+                  <a:pt x="3762" y="14117"/>
+                </a:lnTo>
+                <a:lnTo>
+                  <a:pt x="4177" y="13873"/>
+                </a:lnTo>
+                <a:lnTo>
+                  <a:pt x="4592" y="13604"/>
+                </a:lnTo>
+                <a:lnTo>
+                  <a:pt x="4983" y="13238"/>
+                </a:lnTo>
+                <a:lnTo>
+                  <a:pt x="5349" y="13360"/>
+                </a:lnTo>
+                <a:lnTo>
+                  <a:pt x="5716" y="13482"/>
+                </a:lnTo>
+                <a:lnTo>
+                  <a:pt x="6106" y="13555"/>
+                </a:lnTo>
+                <a:lnTo>
+                  <a:pt x="6497" y="13628"/>
+                </a:lnTo>
+                <a:lnTo>
+                  <a:pt x="6888" y="13702"/>
+                </a:lnTo>
+                <a:lnTo>
+                  <a:pt x="7279" y="13751"/>
+                </a:lnTo>
+                <a:lnTo>
+                  <a:pt x="7694" y="13775"/>
+                </a:lnTo>
+                <a:lnTo>
+                  <a:pt x="8524" y="13775"/>
+                </a:lnTo>
+                <a:lnTo>
+                  <a:pt x="8939" y="13751"/>
+                </a:lnTo>
+                <a:lnTo>
+                  <a:pt x="9355" y="13702"/>
+                </a:lnTo>
+                <a:lnTo>
+                  <a:pt x="9745" y="13628"/>
+                </a:lnTo>
+                <a:lnTo>
+                  <a:pt x="10136" y="13555"/>
+                </a:lnTo>
+                <a:lnTo>
+                  <a:pt x="10527" y="13458"/>
+                </a:lnTo>
+                <a:lnTo>
+                  <a:pt x="10893" y="13360"/>
+                </a:lnTo>
+                <a:lnTo>
+                  <a:pt x="11260" y="13238"/>
+                </a:lnTo>
+                <a:lnTo>
+                  <a:pt x="11626" y="13091"/>
+                </a:lnTo>
+                <a:lnTo>
+                  <a:pt x="11968" y="12945"/>
+                </a:lnTo>
+                <a:lnTo>
+                  <a:pt x="12310" y="12774"/>
+                </a:lnTo>
+                <a:lnTo>
+                  <a:pt x="12652" y="12603"/>
+                </a:lnTo>
+                <a:lnTo>
+                  <a:pt x="12969" y="12407"/>
+                </a:lnTo>
+                <a:lnTo>
+                  <a:pt x="13262" y="12212"/>
+                </a:lnTo>
+                <a:lnTo>
+                  <a:pt x="13555" y="11992"/>
+                </a:lnTo>
+                <a:lnTo>
+                  <a:pt x="13848" y="11748"/>
+                </a:lnTo>
+                <a:lnTo>
+                  <a:pt x="14117" y="11528"/>
+                </a:lnTo>
+                <a:lnTo>
+                  <a:pt x="14361" y="11259"/>
+                </a:lnTo>
+                <a:lnTo>
+                  <a:pt x="14606" y="11015"/>
+                </a:lnTo>
+                <a:lnTo>
+                  <a:pt x="14825" y="10747"/>
+                </a:lnTo>
+                <a:lnTo>
+                  <a:pt x="15045" y="10453"/>
+                </a:lnTo>
+                <a:lnTo>
+                  <a:pt x="15241" y="10160"/>
+                </a:lnTo>
+                <a:lnTo>
+                  <a:pt x="15412" y="9867"/>
+                </a:lnTo>
+                <a:lnTo>
+                  <a:pt x="15582" y="9574"/>
+                </a:lnTo>
+                <a:lnTo>
+                  <a:pt x="15729" y="9257"/>
+                </a:lnTo>
+                <a:lnTo>
+                  <a:pt x="15851" y="8939"/>
+                </a:lnTo>
+                <a:lnTo>
+                  <a:pt x="15973" y="8597"/>
+                </a:lnTo>
+                <a:lnTo>
+                  <a:pt x="16047" y="8280"/>
+                </a:lnTo>
+                <a:lnTo>
+                  <a:pt x="16120" y="7938"/>
+                </a:lnTo>
+                <a:lnTo>
+                  <a:pt x="16169" y="7596"/>
+                </a:lnTo>
+                <a:lnTo>
+                  <a:pt x="16217" y="7230"/>
+                </a:lnTo>
+                <a:lnTo>
+                  <a:pt x="16217" y="6888"/>
+                </a:lnTo>
+                <a:lnTo>
+                  <a:pt x="16217" y="6521"/>
+                </a:lnTo>
+                <a:lnTo>
+                  <a:pt x="16169" y="6179"/>
+                </a:lnTo>
+                <a:lnTo>
+                  <a:pt x="16120" y="5838"/>
+                </a:lnTo>
+                <a:lnTo>
+                  <a:pt x="16047" y="5496"/>
+                </a:lnTo>
+                <a:lnTo>
+                  <a:pt x="15973" y="5154"/>
+                </a:lnTo>
+                <a:lnTo>
+                  <a:pt x="15851" y="4836"/>
+                </a:lnTo>
+                <a:lnTo>
+                  <a:pt x="15729" y="4519"/>
+                </a:lnTo>
+                <a:lnTo>
+                  <a:pt x="15582" y="4201"/>
+                </a:lnTo>
+                <a:lnTo>
+                  <a:pt x="15412" y="3884"/>
+                </a:lnTo>
+                <a:lnTo>
+                  <a:pt x="15241" y="3591"/>
+                </a:lnTo>
+                <a:lnTo>
+                  <a:pt x="15045" y="3298"/>
+                </a:lnTo>
+                <a:lnTo>
+                  <a:pt x="14825" y="3029"/>
+                </a:lnTo>
+                <a:lnTo>
+                  <a:pt x="14606" y="2760"/>
+                </a:lnTo>
+                <a:lnTo>
+                  <a:pt x="14361" y="2492"/>
+                </a:lnTo>
+                <a:lnTo>
+                  <a:pt x="14117" y="2247"/>
+                </a:lnTo>
+                <a:lnTo>
+                  <a:pt x="13848" y="2003"/>
+                </a:lnTo>
+                <a:lnTo>
+                  <a:pt x="13555" y="1783"/>
+                </a:lnTo>
+                <a:lnTo>
+                  <a:pt x="13262" y="1563"/>
+                </a:lnTo>
+                <a:lnTo>
+                  <a:pt x="12969" y="1368"/>
+                </a:lnTo>
+                <a:lnTo>
+                  <a:pt x="12652" y="1173"/>
+                </a:lnTo>
+                <a:lnTo>
+                  <a:pt x="12310" y="977"/>
+                </a:lnTo>
+                <a:lnTo>
+                  <a:pt x="11968" y="831"/>
+                </a:lnTo>
+                <a:lnTo>
+                  <a:pt x="11626" y="660"/>
+                </a:lnTo>
+                <a:lnTo>
+                  <a:pt x="11260" y="538"/>
+                </a:lnTo>
+                <a:lnTo>
+                  <a:pt x="10893" y="416"/>
+                </a:lnTo>
+                <a:lnTo>
+                  <a:pt x="10527" y="293"/>
+                </a:lnTo>
+                <a:lnTo>
+                  <a:pt x="10136" y="196"/>
+                </a:lnTo>
+                <a:lnTo>
+                  <a:pt x="9745" y="123"/>
+                </a:lnTo>
+                <a:lnTo>
+                  <a:pt x="9355" y="74"/>
+                </a:lnTo>
+                <a:lnTo>
+                  <a:pt x="8939" y="25"/>
+                </a:lnTo>
+                <a:lnTo>
+                  <a:pt x="8524" y="0"/>
+                </a:lnTo>
+                <a:close/>
+              </a:path>
+            </a:pathLst>
+          </a:custGeom>
+          <a:solidFill>
+            <a:srgbClr val="3F4145"/>
+          </a:solidFill>
+          <a:ln>
+            <a:noFill/>
+          </a:ln>
+        </p:spPr>
+        <p:txBody>
+          <a:bodyPr anchorCtr="0" anchor="ctr" bIns="91425" lIns="91425" spcFirstLastPara="1" rIns="91425" wrap="square" tIns="91425">
+            <a:noAutofit/>
+          </a:bodyPr>
+          <a:lstStyle/>
+          <a:p>
+            <a:pPr indent="0" lvl="0" marL="0" rtl="0" algn="l">
+              <a:spcBef>
+                <a:spcPts val="0"/>
+              </a:spcBef>
+              <a:spcAft>
+                <a:spcPts val="0"/>
+              </a:spcAft>
+              <a:buNone/>
+            </a:pPr>
+            <a:r>
+              <a:t/>
+            </a:r>
+            <a:endParaRPr/>
+          </a:p>
+        </p:txBody>
+      </p:sp>
+      <p:cxnSp>
+        <p:nvCxnSpPr>
+          <p:cNvPr id="265" name="Google Shape;265;p33"/>
+          <p:cNvCxnSpPr/>
+          <p:nvPr/>
+        </p:nvCxnSpPr>
+        <p:spPr>
+          <a:xfrm>
+            <a:off x="447192" y="2224672"/>
+            <a:ext cx="694200" cy="0"/>
+          </a:xfrm>
+          <a:prstGeom prst="straightConnector1">
+            <a:avLst/>
+          </a:prstGeom>
+          <a:noFill/>
+          <a:ln cap="flat" cmpd="sng" w="25400">
+            <a:solidFill>
+              <a:srgbClr val="393A3F"/>
+            </a:solidFill>
+            <a:prstDash val="solid"/>
+            <a:miter lim="400000"/>
+            <a:headEnd len="sm" w="sm" type="none"/>
+            <a:tailEnd len="sm" w="sm" type="none"/>
+          </a:ln>
+        </p:spPr>
+      </p:cxnSp>
     </p:spTree>
   </p:cSld>
   <p:clrMapOvr>
@@ -16863,6 +17967,285 @@
 </file>
 
 <file path=ppt/theme/theme1.xml><?xml version="1.0" encoding="utf-8"?>
+<a:theme xmlns:a="http://schemas.openxmlformats.org/drawingml/2006/main" xmlns:r="http://schemas.openxmlformats.org/officeDocument/2006/relationships" name="Simple Light">
+  <a:themeElements>
+    <a:clrScheme name="Simple Light">
+      <a:dk1>
+        <a:srgbClr val="000000"/>
+      </a:dk1>
+      <a:lt1>
+        <a:srgbClr val="FFFFFF"/>
+      </a:lt1>
+      <a:dk2>
+        <a:srgbClr val="595959"/>
+      </a:dk2>
+      <a:lt2>
+        <a:srgbClr val="EEEEEE"/>
+      </a:lt2>
+      <a:accent1>
+        <a:srgbClr val="4285F4"/>
+      </a:accent1>
+      <a:accent2>
+        <a:srgbClr val="212121"/>
+      </a:accent2>
+      <a:accent3>
+        <a:srgbClr val="78909C"/>
+      </a:accent3>
+      <a:accent4>
+        <a:srgbClr val="FFAB40"/>
+      </a:accent4>
+      <a:accent5>
+        <a:srgbClr val="0097A7"/>
+      </a:accent5>
+      <a:accent6>
+        <a:srgbClr val="EEFF41"/>
+      </a:accent6>
+      <a:hlink>
+        <a:srgbClr val="0097A7"/>
+      </a:hlink>
+      <a:folHlink>
+        <a:srgbClr val="0097A7"/>
+      </a:folHlink>
+    </a:clrScheme>
+    <a:fontScheme name="Office">
+      <a:majorFont>
+        <a:latin typeface="Arial"/>
+        <a:ea typeface=""/>
+        <a:cs typeface=""/>
+        <a:font script="Jpan" typeface="ＭＳ Ｐゴシック"/>
+        <a:font script="Hang" typeface="맑은 고딕"/>
+        <a:font script="Hans" typeface="宋体"/>
+        <a:font script="Hant" typeface="新細明體"/>
+        <a:font script="Arab" typeface="Times New Roman"/>
+        <a:font script="Hebr" typeface="Times New Roman"/>
+        <a:font script="Thai" typeface="Angsana New"/>
+        <a:font script="Ethi" typeface="Nyala"/>
+        <a:font script="Beng" typeface="Vrinda"/>
+        <a:font script="Gujr" typeface="Shruti"/>
+        <a:font script="Khmr" typeface="MoolBoran"/>
+        <a:font script="Knda" typeface="Tunga"/>
+        <a:font script="Guru" typeface="Raavi"/>
+        <a:font script="Cans" typeface="Euphemia"/>
+        <a:font script="Cher" typeface="Plantagenet Cherokee"/>
+        <a:font script="Yiii" typeface="Microsoft Yi Baiti"/>
+        <a:font script="Tibt" typeface="Microsoft Himalaya"/>
+        <a:font script="Thaa" typeface="MV Boli"/>
+        <a:font script="Deva" typeface="Mangal"/>
+        <a:font script="Telu" typeface="Gautami"/>
+        <a:font script="Taml" typeface="Latha"/>
+        <a:font script="Syrc" typeface="Estrangelo Edessa"/>
+        <a:font script="Orya" typeface="Kalinga"/>
+        <a:font script="Mlym" typeface="Kartika"/>
+        <a:font script="Laoo" typeface="DokChampa"/>
+        <a:font script="Sinh" typeface="Iskoola Pota"/>
+        <a:font script="Mong" typeface="Mongolian Baiti"/>
+        <a:font script="Viet" typeface="Times New Roman"/>
+        <a:font script="Uigh" typeface="Microsoft Uighur"/>
+        <a:font script="Geor" typeface="Sylfaen"/>
+      </a:majorFont>
+      <a:minorFont>
+        <a:latin typeface="Arial"/>
+        <a:ea typeface=""/>
+        <a:cs typeface=""/>
+        <a:font script="Jpan" typeface="ＭＳ Ｐゴシック"/>
+        <a:font script="Hang" typeface="맑은 고딕"/>
+        <a:font script="Hans" typeface="宋体"/>
+        <a:font script="Hant" typeface="新細明體"/>
+        <a:font script="Arab" typeface="Arial"/>
+        <a:font script="Hebr" typeface="Arial"/>
+        <a:font script="Thai" typeface="Cordia New"/>
+        <a:font script="Ethi" typeface="Nyala"/>
+        <a:font script="Beng" typeface="Vrinda"/>
+        <a:font script="Gujr" typeface="Shruti"/>
+        <a:font script="Khmr" typeface="DaunPenh"/>
+        <a:font script="Knda" typeface="Tunga"/>
+        <a:font script="Guru" typeface="Raavi"/>
+        <a:font script="Cans" typeface="Euphemia"/>
+        <a:font script="Cher" typeface="Plantagenet Cherokee"/>
+        <a:font script="Yiii" typeface="Microsoft Yi Baiti"/>
+        <a:font script="Tibt" typeface="Microsoft Himalaya"/>
+        <a:font script="Thaa" typeface="MV Boli"/>
+        <a:font script="Deva" typeface="Mangal"/>
+        <a:font script="Telu" typeface="Gautami"/>
+        <a:font script="Taml" typeface="Latha"/>
+        <a:font script="Syrc" typeface="Estrangelo Edessa"/>
+        <a:font script="Orya" typeface="Kalinga"/>
+        <a:font script="Mlym" typeface="Kartika"/>
+        <a:font script="Laoo" typeface="DokChampa"/>
+        <a:font script="Sinh" typeface="Iskoola Pota"/>
+        <a:font script="Mong" typeface="Mongolian Baiti"/>
+        <a:font script="Viet" typeface="Arial"/>
+        <a:font script="Uigh" typeface="Microsoft Uighur"/>
+        <a:font script="Geor" typeface="Sylfaen"/>
+      </a:minorFont>
+    </a:fontScheme>
+    <a:fmtScheme name="Office">
+      <a:fillStyleLst>
+        <a:solidFill>
+          <a:schemeClr val="phClr"/>
+        </a:solidFill>
+        <a:gradFill rotWithShape="1">
+          <a:gsLst>
+            <a:gs pos="0">
+              <a:schemeClr val="phClr">
+                <a:tint val="50000"/>
+                <a:satMod val="300000"/>
+              </a:schemeClr>
+            </a:gs>
+            <a:gs pos="35000">
+              <a:schemeClr val="phClr">
+                <a:tint val="37000"/>
+                <a:satMod val="300000"/>
+              </a:schemeClr>
+            </a:gs>
+            <a:gs pos="100000">
+              <a:schemeClr val="phClr">
+                <a:tint val="15000"/>
+                <a:satMod val="350000"/>
+              </a:schemeClr>
+            </a:gs>
+          </a:gsLst>
+          <a:lin ang="16200000" scaled="1"/>
+        </a:gradFill>
+        <a:gradFill rotWithShape="1">
+          <a:gsLst>
+            <a:gs pos="0">
+              <a:schemeClr val="phClr">
+                <a:tint val="100000"/>
+                <a:shade val="100000"/>
+                <a:satMod val="130000"/>
+              </a:schemeClr>
+            </a:gs>
+            <a:gs pos="100000">
+              <a:schemeClr val="phClr">
+                <a:tint val="50000"/>
+                <a:shade val="100000"/>
+                <a:satMod val="350000"/>
+              </a:schemeClr>
+            </a:gs>
+          </a:gsLst>
+          <a:lin ang="16200000" scaled="0"/>
+        </a:gradFill>
+      </a:fillStyleLst>
+      <a:lnStyleLst>
+        <a:ln w="9525" cap="flat" cmpd="sng" algn="ctr">
+          <a:solidFill>
+            <a:schemeClr val="phClr">
+              <a:shade val="95000"/>
+              <a:satMod val="105000"/>
+            </a:schemeClr>
+          </a:solidFill>
+          <a:prstDash val="solid"/>
+        </a:ln>
+        <a:ln w="25400" cap="flat" cmpd="sng" algn="ctr">
+          <a:solidFill>
+            <a:schemeClr val="phClr"/>
+          </a:solidFill>
+          <a:prstDash val="solid"/>
+        </a:ln>
+        <a:ln w="38100" cap="flat" cmpd="sng" algn="ctr">
+          <a:solidFill>
+            <a:schemeClr val="phClr"/>
+          </a:solidFill>
+          <a:prstDash val="solid"/>
+        </a:ln>
+      </a:lnStyleLst>
+      <a:effectStyleLst>
+        <a:effectStyle>
+          <a:effectLst>
+            <a:outerShdw blurRad="40000" dist="20000" dir="5400000" rotWithShape="0">
+              <a:srgbClr val="000000">
+                <a:alpha val="38000"/>
+              </a:srgbClr>
+            </a:outerShdw>
+          </a:effectLst>
+        </a:effectStyle>
+        <a:effectStyle>
+          <a:effectLst>
+            <a:outerShdw blurRad="40000" dist="23000" dir="5400000" rotWithShape="0">
+              <a:srgbClr val="000000">
+                <a:alpha val="35000"/>
+              </a:srgbClr>
+            </a:outerShdw>
+          </a:effectLst>
+        </a:effectStyle>
+        <a:effectStyle>
+          <a:effectLst>
+            <a:outerShdw blurRad="40000" dist="23000" dir="5400000" rotWithShape="0">
+              <a:srgbClr val="000000">
+                <a:alpha val="35000"/>
+              </a:srgbClr>
+            </a:outerShdw>
+          </a:effectLst>
+          <a:scene3d>
+            <a:camera prst="orthographicFront">
+              <a:rot lat="0" lon="0" rev="0"/>
+            </a:camera>
+            <a:lightRig rig="threePt" dir="t">
+              <a:rot lat="0" lon="0" rev="1200000"/>
+            </a:lightRig>
+          </a:scene3d>
+          <a:sp3d>
+            <a:bevelT w="63500" h="25400"/>
+          </a:sp3d>
+        </a:effectStyle>
+      </a:effectStyleLst>
+      <a:bgFillStyleLst>
+        <a:solidFill>
+          <a:schemeClr val="phClr"/>
+        </a:solidFill>
+        <a:gradFill rotWithShape="1">
+          <a:gsLst>
+            <a:gs pos="0">
+              <a:schemeClr val="phClr">
+                <a:tint val="40000"/>
+                <a:satMod val="350000"/>
+              </a:schemeClr>
+            </a:gs>
+            <a:gs pos="40000">
+              <a:schemeClr val="phClr">
+                <a:tint val="45000"/>
+                <a:shade val="99000"/>
+                <a:satMod val="350000"/>
+              </a:schemeClr>
+            </a:gs>
+            <a:gs pos="100000">
+              <a:schemeClr val="phClr">
+                <a:shade val="20000"/>
+                <a:satMod val="255000"/>
+              </a:schemeClr>
+            </a:gs>
+          </a:gsLst>
+          <a:path path="circle">
+            <a:fillToRect l="50000" t="-80000" r="50000" b="180000"/>
+          </a:path>
+        </a:gradFill>
+        <a:gradFill rotWithShape="1">
+          <a:gsLst>
+            <a:gs pos="0">
+              <a:schemeClr val="phClr">
+                <a:tint val="80000"/>
+                <a:satMod val="300000"/>
+              </a:schemeClr>
+            </a:gs>
+            <a:gs pos="100000">
+              <a:schemeClr val="phClr">
+                <a:shade val="30000"/>
+                <a:satMod val="200000"/>
+              </a:schemeClr>
+            </a:gs>
+          </a:gsLst>
+          <a:path path="circle">
+            <a:fillToRect l="50000" t="50000" r="50000" b="50000"/>
+          </a:path>
+        </a:gradFill>
+      </a:bgFillStyleLst>
+    </a:fmtScheme>
+  </a:themeElements>
+</a:theme>
+</file>
+
+<file path=ppt/theme/theme2.xml><?xml version="1.0" encoding="utf-8"?>
 <a:theme xmlns:a="http://schemas.openxmlformats.org/drawingml/2006/main" xmlns:r="http://schemas.openxmlformats.org/officeDocument/2006/relationships">
   <a:themeElements>
     <a:clrScheme name="Default">
@@ -17139,283 +18522,4 @@
     </a:fmtScheme>
   </a:themeElements>
 </a:theme>
-</file>
-
-<file path=ppt/theme/theme2.xml><?xml version="1.0" encoding="utf-8"?>
-<a:theme xmlns:a="http://schemas.openxmlformats.org/drawingml/2006/main" xmlns:r="http://schemas.openxmlformats.org/officeDocument/2006/relationships" name="Simple Light">
-  <a:themeElements>
-    <a:clrScheme name="Simple Light">
-      <a:dk1>
-        <a:srgbClr val="000000"/>
-      </a:dk1>
-      <a:lt1>
-        <a:srgbClr val="FFFFFF"/>
-      </a:lt1>
-      <a:dk2>
-        <a:srgbClr val="595959"/>
-      </a:dk2>
-      <a:lt2>
-        <a:srgbClr val="EEEEEE"/>
-      </a:lt2>
-      <a:accent1>
-        <a:srgbClr val="4285F4"/>
-      </a:accent1>
-      <a:accent2>
-        <a:srgbClr val="212121"/>
-      </a:accent2>
-      <a:accent3>
-        <a:srgbClr val="78909C"/>
-      </a:accent3>
-      <a:accent4>
-        <a:srgbClr val="FFAB40"/>
-      </a:accent4>
-      <a:accent5>
-        <a:srgbClr val="0097A7"/>
-      </a:accent5>
-      <a:accent6>
-        <a:srgbClr val="EEFF41"/>
-      </a:accent6>
-      <a:hlink>
-        <a:srgbClr val="0097A7"/>
-      </a:hlink>
-      <a:folHlink>
-        <a:srgbClr val="0097A7"/>
-      </a:folHlink>
-    </a:clrScheme>
-    <a:fontScheme name="Office">
-      <a:majorFont>
-        <a:latin typeface="Arial"/>
-        <a:ea typeface=""/>
-        <a:cs typeface=""/>
-        <a:font script="Jpan" typeface="ＭＳ Ｐゴシック"/>
-        <a:font script="Hang" typeface="맑은 고딕"/>
-        <a:font script="Hans" typeface="宋体"/>
-        <a:font script="Hant" typeface="新細明體"/>
-        <a:font script="Arab" typeface="Times New Roman"/>
-        <a:font script="Hebr" typeface="Times New Roman"/>
-        <a:font script="Thai" typeface="Angsana New"/>
-        <a:font script="Ethi" typeface="Nyala"/>
-        <a:font script="Beng" typeface="Vrinda"/>
-        <a:font script="Gujr" typeface="Shruti"/>
-        <a:font script="Khmr" typeface="MoolBoran"/>
-        <a:font script="Knda" typeface="Tunga"/>
-        <a:font script="Guru" typeface="Raavi"/>
-        <a:font script="Cans" typeface="Euphemia"/>
-        <a:font script="Cher" typeface="Plantagenet Cherokee"/>
-        <a:font script="Yiii" typeface="Microsoft Yi Baiti"/>
-        <a:font script="Tibt" typeface="Microsoft Himalaya"/>
-        <a:font script="Thaa" typeface="MV Boli"/>
-        <a:font script="Deva" typeface="Mangal"/>
-        <a:font script="Telu" typeface="Gautami"/>
-        <a:font script="Taml" typeface="Latha"/>
-        <a:font script="Syrc" typeface="Estrangelo Edessa"/>
-        <a:font script="Orya" typeface="Kalinga"/>
-        <a:font script="Mlym" typeface="Kartika"/>
-        <a:font script="Laoo" typeface="DokChampa"/>
-        <a:font script="Sinh" typeface="Iskoola Pota"/>
-        <a:font script="Mong" typeface="Mongolian Baiti"/>
-        <a:font script="Viet" typeface="Times New Roman"/>
-        <a:font script="Uigh" typeface="Microsoft Uighur"/>
-        <a:font script="Geor" typeface="Sylfaen"/>
-      </a:majorFont>
-      <a:minorFont>
-        <a:latin typeface="Arial"/>
-        <a:ea typeface=""/>
-        <a:cs typeface=""/>
-        <a:font script="Jpan" typeface="ＭＳ Ｐゴシック"/>
-        <a:font script="Hang" typeface="맑은 고딕"/>
-        <a:font script="Hans" typeface="宋体"/>
-        <a:font script="Hant" typeface="新細明體"/>
-        <a:font script="Arab" typeface="Arial"/>
-        <a:font script="Hebr" typeface="Arial"/>
-        <a:font script="Thai" typeface="Cordia New"/>
-        <a:font script="Ethi" typeface="Nyala"/>
-        <a:font script="Beng" typeface="Vrinda"/>
-        <a:font script="Gujr" typeface="Shruti"/>
-        <a:font script="Khmr" typeface="DaunPenh"/>
-        <a:font script="Knda" typeface="Tunga"/>
-        <a:font script="Guru" typeface="Raavi"/>
-        <a:font script="Cans" typeface="Euphemia"/>
-        <a:font script="Cher" typeface="Plantagenet Cherokee"/>
-        <a:font script="Yiii" typeface="Microsoft Yi Baiti"/>
-        <a:font script="Tibt" typeface="Microsoft Himalaya"/>
-        <a:font script="Thaa" typeface="MV Boli"/>
-        <a:font script="Deva" typeface="Mangal"/>
-        <a:font script="Telu" typeface="Gautami"/>
-        <a:font script="Taml" typeface="Latha"/>
-        <a:font script="Syrc" typeface="Estrangelo Edessa"/>
-        <a:font script="Orya" typeface="Kalinga"/>
-        <a:font script="Mlym" typeface="Kartika"/>
-        <a:font script="Laoo" typeface="DokChampa"/>
-        <a:font script="Sinh" typeface="Iskoola Pota"/>
-        <a:font script="Mong" typeface="Mongolian Baiti"/>
-        <a:font script="Viet" typeface="Arial"/>
-        <a:font script="Uigh" typeface="Microsoft Uighur"/>
-        <a:font script="Geor" typeface="Sylfaen"/>
-      </a:minorFont>
-    </a:fontScheme>
-    <a:fmtScheme name="Office">
-      <a:fillStyleLst>
-        <a:solidFill>
-          <a:schemeClr val="phClr"/>
-        </a:solidFill>
-        <a:gradFill rotWithShape="1">
-          <a:gsLst>
-            <a:gs pos="0">
-              <a:schemeClr val="phClr">
-                <a:tint val="50000"/>
-                <a:satMod val="300000"/>
-              </a:schemeClr>
-            </a:gs>
-            <a:gs pos="35000">
-              <a:schemeClr val="phClr">
-                <a:tint val="37000"/>
-                <a:satMod val="300000"/>
-              </a:schemeClr>
-            </a:gs>
-            <a:gs pos="100000">
-              <a:schemeClr val="phClr">
-                <a:tint val="15000"/>
-                <a:satMod val="350000"/>
-              </a:schemeClr>
-            </a:gs>
-          </a:gsLst>
-          <a:lin ang="16200000" scaled="1"/>
-        </a:gradFill>
-        <a:gradFill rotWithShape="1">
-          <a:gsLst>
-            <a:gs pos="0">
-              <a:schemeClr val="phClr">
-                <a:tint val="100000"/>
-                <a:shade val="100000"/>
-                <a:satMod val="130000"/>
-              </a:schemeClr>
-            </a:gs>
-            <a:gs pos="100000">
-              <a:schemeClr val="phClr">
-                <a:tint val="50000"/>
-                <a:shade val="100000"/>
-                <a:satMod val="350000"/>
-              </a:schemeClr>
-            </a:gs>
-          </a:gsLst>
-          <a:lin ang="16200000" scaled="0"/>
-        </a:gradFill>
-      </a:fillStyleLst>
-      <a:lnStyleLst>
-        <a:ln w="9525" cap="flat" cmpd="sng" algn="ctr">
-          <a:solidFill>
-            <a:schemeClr val="phClr">
-              <a:shade val="95000"/>
-              <a:satMod val="105000"/>
-            </a:schemeClr>
-          </a:solidFill>
-          <a:prstDash val="solid"/>
-        </a:ln>
-        <a:ln w="25400" cap="flat" cmpd="sng" algn="ctr">
-          <a:solidFill>
-            <a:schemeClr val="phClr"/>
-          </a:solidFill>
-          <a:prstDash val="solid"/>
-        </a:ln>
-        <a:ln w="38100" cap="flat" cmpd="sng" algn="ctr">
-          <a:solidFill>
-            <a:schemeClr val="phClr"/>
-          </a:solidFill>
-          <a:prstDash val="solid"/>
-        </a:ln>
-      </a:lnStyleLst>
-      <a:effectStyleLst>
-        <a:effectStyle>
-          <a:effectLst>
-            <a:outerShdw blurRad="40000" dist="20000" dir="5400000" rotWithShape="0">
-              <a:srgbClr val="000000">
-                <a:alpha val="38000"/>
-              </a:srgbClr>
-            </a:outerShdw>
-          </a:effectLst>
-        </a:effectStyle>
-        <a:effectStyle>
-          <a:effectLst>
-            <a:outerShdw blurRad="40000" dist="23000" dir="5400000" rotWithShape="0">
-              <a:srgbClr val="000000">
-                <a:alpha val="35000"/>
-              </a:srgbClr>
-            </a:outerShdw>
-          </a:effectLst>
-        </a:effectStyle>
-        <a:effectStyle>
-          <a:effectLst>
-            <a:outerShdw blurRad="40000" dist="23000" dir="5400000" rotWithShape="0">
-              <a:srgbClr val="000000">
-                <a:alpha val="35000"/>
-              </a:srgbClr>
-            </a:outerShdw>
-          </a:effectLst>
-          <a:scene3d>
-            <a:camera prst="orthographicFront">
-              <a:rot lat="0" lon="0" rev="0"/>
-            </a:camera>
-            <a:lightRig rig="threePt" dir="t">
-              <a:rot lat="0" lon="0" rev="1200000"/>
-            </a:lightRig>
-          </a:scene3d>
-          <a:sp3d>
-            <a:bevelT w="63500" h="25400"/>
-          </a:sp3d>
-        </a:effectStyle>
-      </a:effectStyleLst>
-      <a:bgFillStyleLst>
-        <a:solidFill>
-          <a:schemeClr val="phClr"/>
-        </a:solidFill>
-        <a:gradFill rotWithShape="1">
-          <a:gsLst>
-            <a:gs pos="0">
-              <a:schemeClr val="phClr">
-                <a:tint val="40000"/>
-                <a:satMod val="350000"/>
-              </a:schemeClr>
-            </a:gs>
-            <a:gs pos="40000">
-              <a:schemeClr val="phClr">
-                <a:tint val="45000"/>
-                <a:shade val="99000"/>
-                <a:satMod val="350000"/>
-              </a:schemeClr>
-            </a:gs>
-            <a:gs pos="100000">
-              <a:schemeClr val="phClr">
-                <a:shade val="20000"/>
-                <a:satMod val="255000"/>
-              </a:schemeClr>
-            </a:gs>
-          </a:gsLst>
-          <a:path path="circle">
-            <a:fillToRect l="50000" t="-80000" r="50000" b="180000"/>
-          </a:path>
-        </a:gradFill>
-        <a:gradFill rotWithShape="1">
-          <a:gsLst>
-            <a:gs pos="0">
-              <a:schemeClr val="phClr">
-                <a:tint val="80000"/>
-                <a:satMod val="300000"/>
-              </a:schemeClr>
-            </a:gs>
-            <a:gs pos="100000">
-              <a:schemeClr val="phClr">
-                <a:shade val="30000"/>
-                <a:satMod val="200000"/>
-              </a:schemeClr>
-            </a:gs>
-          </a:gsLst>
-          <a:path path="circle">
-            <a:fillToRect l="50000" t="50000" r="50000" b="50000"/>
-          </a:path>
-        </a:gradFill>
-      </a:bgFillStyleLst>
-    </a:fmtScheme>
-  </a:themeElements>
-</a:theme>
 </file>
</xml_diff>